<commit_message>
Update Lecture2 - Statistical Learning.pptx
</commit_message>
<xml_diff>
--- a/_umkc-teaching/slides/Lecture2 - Statistical Learning.pptx
+++ b/_umkc-teaching/slides/Lecture2 - Statistical Learning.pptx
@@ -5,7 +5,7 @@
     <p:sldMasterId id="2147483648" r:id="rId1"/>
   </p:sldMasterIdLst>
   <p:notesMasterIdLst>
-    <p:notesMasterId r:id="rId20"/>
+    <p:notesMasterId r:id="rId24"/>
   </p:notesMasterIdLst>
   <p:sldIdLst>
     <p:sldId id="257" r:id="rId2"/>
@@ -22,10 +22,14 @@
     <p:sldId id="301" r:id="rId13"/>
     <p:sldId id="302" r:id="rId14"/>
     <p:sldId id="307" r:id="rId15"/>
-    <p:sldId id="303" r:id="rId16"/>
-    <p:sldId id="304" r:id="rId17"/>
-    <p:sldId id="305" r:id="rId18"/>
-    <p:sldId id="293" r:id="rId19"/>
+    <p:sldId id="311" r:id="rId16"/>
+    <p:sldId id="310" r:id="rId17"/>
+    <p:sldId id="303" r:id="rId18"/>
+    <p:sldId id="312" r:id="rId19"/>
+    <p:sldId id="304" r:id="rId20"/>
+    <p:sldId id="305" r:id="rId21"/>
+    <p:sldId id="309" r:id="rId22"/>
+    <p:sldId id="293" r:id="rId23"/>
   </p:sldIdLst>
   <p:sldSz cx="12192000" cy="6858000"/>
   <p:notesSz cx="6858000" cy="9144000"/>
@@ -9354,10 +9358,10 @@
       </p:grpSpPr>
       <p:sp>
         <p:nvSpPr>
-          <p:cNvPr id="2" name="Title 1">
+          <p:cNvPr id="6" name="Title 5">
             <a:extLst>
               <a:ext uri="{FF2B5EF4-FFF2-40B4-BE49-F238E27FC236}">
-                <a16:creationId xmlns:a16="http://schemas.microsoft.com/office/drawing/2014/main" id="{5F69E904-77AE-3048-8D9D-BEAC840793F6}"/>
+                <a16:creationId xmlns:a16="http://schemas.microsoft.com/office/drawing/2014/main" id="{7A32B1CF-265D-D742-A37C-6FB0FA629387}"/>
               </a:ext>
             </a:extLst>
           </p:cNvPr>
@@ -9375,17 +9379,17 @@
           <a:p>
             <a:r>
               <a:rPr lang="en-US" dirty="0"/>
-              <a:t>Bias and Variance Trade-off</a:t>
+              <a:t>Classification Models</a:t>
             </a:r>
           </a:p>
         </p:txBody>
       </p:sp>
       <p:sp>
         <p:nvSpPr>
-          <p:cNvPr id="6" name="TextBox 5">
+          <p:cNvPr id="12" name="TextBox 11">
             <a:extLst>
               <a:ext uri="{FF2B5EF4-FFF2-40B4-BE49-F238E27FC236}">
-                <a16:creationId xmlns:a16="http://schemas.microsoft.com/office/drawing/2014/main" id="{0A4ABCA8-D712-A84D-B4FD-C2833F2EB162}"/>
+                <a16:creationId xmlns:a16="http://schemas.microsoft.com/office/drawing/2014/main" id="{752A6D5A-3CFA-3245-8A94-4F5E03513DD3}"/>
               </a:ext>
             </a:extLst>
           </p:cNvPr>
@@ -9394,8 +9398,8 @@
         </p:nvSpPr>
         <p:spPr>
           <a:xfrm>
-            <a:off x="838200" y="1834151"/>
-            <a:ext cx="10515600" cy="523220"/>
+            <a:off x="838200" y="1956348"/>
+            <a:ext cx="10515600" cy="461665"/>
           </a:xfrm>
           <a:prstGeom prst="rect">
             <a:avLst/>
@@ -9409,8 +9413,8 @@
           <a:lstStyle/>
           <a:p>
             <a:r>
-              <a:rPr lang="en-US" sz="2800" dirty="0"/>
-              <a:t>If a model is more complicated (e.g., with more parameters):</a:t>
+              <a:rPr lang="en-US" sz="2400" dirty="0"/>
+              <a:t>The output of classification models are labels </a:t>
             </a:r>
           </a:p>
         </p:txBody>
@@ -9420,7 +9424,7 @@
           <p:cNvPr id="7" name="TextBox 6">
             <a:extLst>
               <a:ext uri="{FF2B5EF4-FFF2-40B4-BE49-F238E27FC236}">
-                <a16:creationId xmlns:a16="http://schemas.microsoft.com/office/drawing/2014/main" id="{7EB2BC32-9BBB-D946-8261-BDC911714E50}"/>
+                <a16:creationId xmlns:a16="http://schemas.microsoft.com/office/drawing/2014/main" id="{547F8AC0-2AE6-0B47-9E7D-2A61514ADF44}"/>
               </a:ext>
             </a:extLst>
           </p:cNvPr>
@@ -9429,8 +9433,8 @@
         </p:nvSpPr>
         <p:spPr>
           <a:xfrm>
-            <a:off x="1554480" y="2641871"/>
-            <a:ext cx="10515600" cy="523220"/>
+            <a:off x="1356360" y="2683673"/>
+            <a:ext cx="10515600" cy="461665"/>
           </a:xfrm>
           <a:prstGeom prst="rect">
             <a:avLst/>
@@ -9444,18 +9448,18 @@
           <a:lstStyle/>
           <a:p>
             <a:r>
-              <a:rPr lang="en-US" sz="2800" dirty="0"/>
-              <a:t>The bias is expected to be smaller</a:t>
+              <a:rPr lang="en-US" sz="2400" dirty="0"/>
+              <a:t>Logistic Regression Models</a:t>
             </a:r>
           </a:p>
         </p:txBody>
       </p:sp>
       <p:sp>
         <p:nvSpPr>
-          <p:cNvPr id="8" name="TextBox 7">
+          <p:cNvPr id="9" name="TextBox 8">
             <a:extLst>
               <a:ext uri="{FF2B5EF4-FFF2-40B4-BE49-F238E27FC236}">
-                <a16:creationId xmlns:a16="http://schemas.microsoft.com/office/drawing/2014/main" id="{587BD057-652D-4E49-BD81-2FFEE86B1E31}"/>
+                <a16:creationId xmlns:a16="http://schemas.microsoft.com/office/drawing/2014/main" id="{A43DCEA7-9670-9341-92AD-4ACC284CF6F5}"/>
               </a:ext>
             </a:extLst>
           </p:cNvPr>
@@ -9464,8 +9468,8 @@
         </p:nvSpPr>
         <p:spPr>
           <a:xfrm>
-            <a:off x="1554480" y="3431300"/>
-            <a:ext cx="10515600" cy="523220"/>
+            <a:off x="1356360" y="3410998"/>
+            <a:ext cx="10515600" cy="461665"/>
           </a:xfrm>
           <a:prstGeom prst="rect">
             <a:avLst/>
@@ -9479,8 +9483,43 @@
           <a:lstStyle/>
           <a:p>
             <a:r>
-              <a:rPr lang="en-US" sz="2800" dirty="0"/>
-              <a:t>The variance is expected to be larger</a:t>
+              <a:rPr lang="en-US" sz="2400" dirty="0"/>
+              <a:t>Support Vector Machine</a:t>
+            </a:r>
+          </a:p>
+        </p:txBody>
+      </p:sp>
+      <p:sp>
+        <p:nvSpPr>
+          <p:cNvPr id="11" name="TextBox 10">
+            <a:extLst>
+              <a:ext uri="{FF2B5EF4-FFF2-40B4-BE49-F238E27FC236}">
+                <a16:creationId xmlns:a16="http://schemas.microsoft.com/office/drawing/2014/main" id="{5D7E7E63-905E-EA47-8FFD-38085A067B4B}"/>
+              </a:ext>
+            </a:extLst>
+          </p:cNvPr>
+          <p:cNvSpPr txBox="1"/>
+          <p:nvPr/>
+        </p:nvSpPr>
+        <p:spPr>
+          <a:xfrm>
+            <a:off x="1356360" y="4138323"/>
+            <a:ext cx="10515600" cy="461665"/>
+          </a:xfrm>
+          <a:prstGeom prst="rect">
+            <a:avLst/>
+          </a:prstGeom>
+          <a:noFill/>
+        </p:spPr>
+        <p:txBody>
+          <a:bodyPr wrap="square">
+            <a:spAutoFit/>
+          </a:bodyPr>
+          <a:lstStyle/>
+          <a:p>
+            <a:r>
+              <a:rPr lang="en-US" sz="2400" dirty="0"/>
+              <a:t>K-Nearest Neighbors</a:t>
             </a:r>
           </a:p>
         </p:txBody>
@@ -9488,7 +9527,7 @@
     </p:spTree>
     <p:extLst>
       <p:ext uri="{BB962C8B-B14F-4D97-AF65-F5344CB8AC3E}">
-        <p14:creationId xmlns:p14="http://schemas.microsoft.com/office/powerpoint/2010/main" val="3439712220"/>
+        <p14:creationId xmlns:p14="http://schemas.microsoft.com/office/powerpoint/2010/main" val="1237694814"/>
       </p:ext>
     </p:extLst>
   </p:cSld>
@@ -9517,10 +9556,10 @@
       </p:grpSpPr>
       <p:sp>
         <p:nvSpPr>
-          <p:cNvPr id="2" name="Title 1">
+          <p:cNvPr id="6" name="Title 5">
             <a:extLst>
               <a:ext uri="{FF2B5EF4-FFF2-40B4-BE49-F238E27FC236}">
-                <a16:creationId xmlns:a16="http://schemas.microsoft.com/office/drawing/2014/main" id="{5F69E904-77AE-3048-8D9D-BEAC840793F6}"/>
+                <a16:creationId xmlns:a16="http://schemas.microsoft.com/office/drawing/2014/main" id="{7A32B1CF-265D-D742-A37C-6FB0FA629387}"/>
               </a:ext>
             </a:extLst>
           </p:cNvPr>
@@ -9538,17 +9577,17 @@
           <a:p>
             <a:r>
               <a:rPr lang="en-US" dirty="0"/>
-              <a:t>Accuracy and Interpretability Trade-off</a:t>
+              <a:t>Model Bias and Variance</a:t>
             </a:r>
           </a:p>
         </p:txBody>
       </p:sp>
       <p:sp>
         <p:nvSpPr>
-          <p:cNvPr id="6" name="TextBox 5">
+          <p:cNvPr id="9" name="TextBox 8">
             <a:extLst>
               <a:ext uri="{FF2B5EF4-FFF2-40B4-BE49-F238E27FC236}">
-                <a16:creationId xmlns:a16="http://schemas.microsoft.com/office/drawing/2014/main" id="{0A4ABCA8-D712-A84D-B4FD-C2833F2EB162}"/>
+                <a16:creationId xmlns:a16="http://schemas.microsoft.com/office/drawing/2014/main" id="{99EFBB9C-068D-D64C-BF53-833F39A474B1}"/>
               </a:ext>
             </a:extLst>
           </p:cNvPr>
@@ -9557,8 +9596,8 @@
         </p:nvSpPr>
         <p:spPr>
           <a:xfrm>
-            <a:off x="838200" y="1834151"/>
-            <a:ext cx="10515600" cy="523220"/>
+            <a:off x="838200" y="3467619"/>
+            <a:ext cx="10515600" cy="461665"/>
           </a:xfrm>
           <a:prstGeom prst="rect">
             <a:avLst/>
@@ -9572,18 +9611,253 @@
           <a:lstStyle/>
           <a:p>
             <a:r>
-              <a:rPr lang="en-US" sz="2800" dirty="0"/>
-              <a:t>If a model is more complicated (e.g., with more parameters):</a:t>
+              <a:rPr lang="en-US" sz="2400" dirty="0"/>
+              <a:t>Model Variance: The variance of parameters (but what is the standard?) </a:t>
             </a:r>
           </a:p>
         </p:txBody>
       </p:sp>
+      <mc:AlternateContent xmlns:mc="http://schemas.openxmlformats.org/markup-compatibility/2006">
+        <mc:Choice xmlns:a14="http://schemas.microsoft.com/office/drawing/2010/main" Requires="a14">
+          <p:sp>
+            <p:nvSpPr>
+              <p:cNvPr id="14" name="TextBox 13">
+                <a:extLst>
+                  <a:ext uri="{FF2B5EF4-FFF2-40B4-BE49-F238E27FC236}">
+                    <a16:creationId xmlns:a16="http://schemas.microsoft.com/office/drawing/2014/main" id="{BE294319-89BD-3845-9927-BCFC95D12C97}"/>
+                  </a:ext>
+                </a:extLst>
+              </p:cNvPr>
+              <p:cNvSpPr txBox="1"/>
+              <p:nvPr/>
+            </p:nvSpPr>
+            <p:spPr>
+              <a:xfrm>
+                <a:off x="838200" y="5014643"/>
+                <a:ext cx="7692390" cy="461665"/>
+              </a:xfrm>
+              <a:prstGeom prst="rect">
+                <a:avLst/>
+              </a:prstGeom>
+              <a:noFill/>
+            </p:spPr>
+            <p:txBody>
+              <a:bodyPr wrap="square">
+                <a:spAutoFit/>
+              </a:bodyPr>
+              <a:lstStyle/>
+              <a:p>
+                <a:pPr/>
+                <a:r>
+                  <a:rPr lang="en-US" sz="2400" b="0" dirty="0"/>
+                  <a:t>Better metric: </a:t>
+                </a:r>
+                <a14:m>
+                  <m:oMath xmlns:m="http://schemas.openxmlformats.org/officeDocument/2006/math">
+                    <m:sSub>
+                      <m:sSubPr>
+                        <m:ctrlPr>
+                          <a:rPr lang="en-US" sz="2400" b="0" i="1" smtClean="0">
+                            <a:latin typeface="Cambria Math" panose="02040503050406030204" pitchFamily="18" charset="0"/>
+                          </a:rPr>
+                        </m:ctrlPr>
+                      </m:sSubPr>
+                      <m:e>
+                        <m:sSub>
+                          <m:sSubPr>
+                            <m:ctrlPr>
+                              <a:rPr lang="en-US" sz="2400" b="0" i="1" smtClean="0">
+                                <a:latin typeface="Cambria Math" panose="02040503050406030204" pitchFamily="18" charset="0"/>
+                              </a:rPr>
+                            </m:ctrlPr>
+                          </m:sSubPr>
+                          <m:e>
+                            <m:r>
+                              <a:rPr lang="en-US" sz="2400" b="0" i="1" smtClean="0">
+                                <a:latin typeface="Cambria Math" panose="02040503050406030204" pitchFamily="18" charset="0"/>
+                              </a:rPr>
+                              <m:t>𝐸</m:t>
+                            </m:r>
+                          </m:e>
+                          <m:sub>
+                            <m:r>
+                              <a:rPr lang="en-US" sz="2400" b="0" i="1" smtClean="0">
+                                <a:latin typeface="Cambria Math" panose="02040503050406030204" pitchFamily="18" charset="0"/>
+                              </a:rPr>
+                              <m:t>𝐷</m:t>
+                            </m:r>
+                          </m:sub>
+                        </m:sSub>
+                        <m:r>
+                          <a:rPr lang="en-US" sz="2400" b="0" i="1" smtClean="0">
+                            <a:latin typeface="Cambria Math" panose="02040503050406030204" pitchFamily="18" charset="0"/>
+                          </a:rPr>
+                          <m:t>[</m:t>
+                        </m:r>
+                        <m:r>
+                          <a:rPr lang="en-US" sz="2400" b="0" i="1" smtClean="0">
+                            <a:latin typeface="Cambria Math" panose="02040503050406030204" pitchFamily="18" charset="0"/>
+                          </a:rPr>
+                          <m:t>𝐸</m:t>
+                        </m:r>
+                      </m:e>
+                      <m:sub>
+                        <m:r>
+                          <a:rPr lang="en-US" sz="2400" b="0" i="1" smtClean="0">
+                            <a:latin typeface="Cambria Math" panose="02040503050406030204" pitchFamily="18" charset="0"/>
+                          </a:rPr>
+                          <m:t>𝐷</m:t>
+                        </m:r>
+                      </m:sub>
+                    </m:sSub>
+                    <m:d>
+                      <m:dPr>
+                        <m:begChr m:val="["/>
+                        <m:endChr m:val="]"/>
+                        <m:ctrlPr>
+                          <a:rPr lang="en-US" sz="2400" b="0" i="1" smtClean="0">
+                            <a:latin typeface="Cambria Math" panose="02040503050406030204" pitchFamily="18" charset="0"/>
+                          </a:rPr>
+                        </m:ctrlPr>
+                      </m:dPr>
+                      <m:e>
+                        <m:r>
+                          <a:rPr lang="en-US" sz="2400" b="0" i="1" smtClean="0">
+                            <a:latin typeface="Cambria Math" panose="02040503050406030204" pitchFamily="18" charset="0"/>
+                          </a:rPr>
+                          <m:t>𝑔</m:t>
+                        </m:r>
+                        <m:d>
+                          <m:dPr>
+                            <m:ctrlPr>
+                              <a:rPr lang="en-US" sz="2400" b="0" i="1" smtClean="0">
+                                <a:latin typeface="Cambria Math" panose="02040503050406030204" pitchFamily="18" charset="0"/>
+                              </a:rPr>
+                            </m:ctrlPr>
+                          </m:dPr>
+                          <m:e>
+                            <m:r>
+                              <a:rPr lang="en-US" sz="2400" b="0" i="1" smtClean="0">
+                                <a:latin typeface="Cambria Math" panose="02040503050406030204" pitchFamily="18" charset="0"/>
+                              </a:rPr>
+                              <m:t>𝑋</m:t>
+                            </m:r>
+                            <m:r>
+                              <a:rPr lang="en-US" sz="2400" b="0" i="1" smtClean="0">
+                                <a:latin typeface="Cambria Math" panose="02040503050406030204" pitchFamily="18" charset="0"/>
+                              </a:rPr>
+                              <m:t>;</m:t>
+                            </m:r>
+                            <m:r>
+                              <a:rPr lang="en-US" sz="2400" b="0" i="1" smtClean="0">
+                                <a:latin typeface="Cambria Math" panose="02040503050406030204" pitchFamily="18" charset="0"/>
+                              </a:rPr>
+                              <m:t>𝐷</m:t>
+                            </m:r>
+                          </m:e>
+                        </m:d>
+                      </m:e>
+                    </m:d>
+                    <m:r>
+                      <a:rPr lang="en-US" sz="2400" b="0" i="1" smtClean="0">
+                        <a:latin typeface="Cambria Math" panose="02040503050406030204" pitchFamily="18" charset="0"/>
+                      </a:rPr>
+                      <m:t> −</m:t>
+                    </m:r>
+                    <m:r>
+                      <a:rPr lang="en-US" sz="2400" b="0" i="1" smtClean="0">
+                        <a:latin typeface="Cambria Math" panose="02040503050406030204" pitchFamily="18" charset="0"/>
+                      </a:rPr>
+                      <m:t>𝑔</m:t>
+                    </m:r>
+                    <m:r>
+                      <a:rPr lang="en-US" sz="2400" b="0" i="1" smtClean="0">
+                        <a:latin typeface="Cambria Math" panose="02040503050406030204" pitchFamily="18" charset="0"/>
+                      </a:rPr>
+                      <m:t>(</m:t>
+                    </m:r>
+                    <m:r>
+                      <a:rPr lang="en-US" sz="2400" b="0" i="1" smtClean="0">
+                        <a:latin typeface="Cambria Math" panose="02040503050406030204" pitchFamily="18" charset="0"/>
+                      </a:rPr>
+                      <m:t>𝑋</m:t>
+                    </m:r>
+                    <m:r>
+                      <a:rPr lang="en-US" sz="2400" b="0" i="1" smtClean="0">
+                        <a:latin typeface="Cambria Math" panose="02040503050406030204" pitchFamily="18" charset="0"/>
+                      </a:rPr>
+                      <m:t>;</m:t>
+                    </m:r>
+                    <m:r>
+                      <a:rPr lang="en-US" sz="2400" b="0" i="1" smtClean="0">
+                        <a:latin typeface="Cambria Math" panose="02040503050406030204" pitchFamily="18" charset="0"/>
+                      </a:rPr>
+                      <m:t>𝐷</m:t>
+                    </m:r>
+                    <m:r>
+                      <a:rPr lang="en-US" sz="2400" b="0" i="1" smtClean="0">
+                        <a:latin typeface="Cambria Math" panose="02040503050406030204" pitchFamily="18" charset="0"/>
+                      </a:rPr>
+                      <m:t>)]</m:t>
+                    </m:r>
+                  </m:oMath>
+                </a14:m>
+                <a:endParaRPr lang="en-US" sz="2400" dirty="0"/>
+              </a:p>
+            </p:txBody>
+          </p:sp>
+        </mc:Choice>
+        <mc:Fallback>
+          <p:sp>
+            <p:nvSpPr>
+              <p:cNvPr id="14" name="TextBox 13">
+                <a:extLst>
+                  <a:ext uri="{FF2B5EF4-FFF2-40B4-BE49-F238E27FC236}">
+                    <a16:creationId xmlns:a16="http://schemas.microsoft.com/office/drawing/2014/main" id="{BE294319-89BD-3845-9927-BCFC95D12C97}"/>
+                  </a:ext>
+                </a:extLst>
+              </p:cNvPr>
+              <p:cNvSpPr txBox="1">
+                <a:spLocks noRot="1" noChangeAspect="1" noMove="1" noResize="1" noEditPoints="1" noAdjustHandles="1" noChangeArrowheads="1" noChangeShapeType="1" noTextEdit="1"/>
+              </p:cNvSpPr>
+              <p:nvPr/>
+            </p:nvSpPr>
+            <p:spPr>
+              <a:xfrm>
+                <a:off x="838200" y="5014643"/>
+                <a:ext cx="7692390" cy="461665"/>
+              </a:xfrm>
+              <a:prstGeom prst="rect">
+                <a:avLst/>
+              </a:prstGeom>
+              <a:blipFill>
+                <a:blip r:embed="rId2"/>
+                <a:stretch>
+                  <a:fillRect l="-1320" t="-8108" b="-29730"/>
+                </a:stretch>
+              </a:blipFill>
+            </p:spPr>
+            <p:txBody>
+              <a:bodyPr/>
+              <a:lstStyle/>
+              <a:p>
+                <a:r>
+                  <a:rPr lang="en-US">
+                    <a:noFill/>
+                  </a:rPr>
+                  <a:t> </a:t>
+                </a:r>
+              </a:p>
+            </p:txBody>
+          </p:sp>
+        </mc:Fallback>
+      </mc:AlternateContent>
       <p:sp>
         <p:nvSpPr>
-          <p:cNvPr id="7" name="TextBox 6">
+          <p:cNvPr id="15" name="TextBox 14">
             <a:extLst>
               <a:ext uri="{FF2B5EF4-FFF2-40B4-BE49-F238E27FC236}">
-                <a16:creationId xmlns:a16="http://schemas.microsoft.com/office/drawing/2014/main" id="{7EB2BC32-9BBB-D946-8261-BDC911714E50}"/>
+                <a16:creationId xmlns:a16="http://schemas.microsoft.com/office/drawing/2014/main" id="{0671E1F6-2CB9-2C4B-AF87-78C7E9F73696}"/>
               </a:ext>
             </a:extLst>
           </p:cNvPr>
@@ -9592,8 +9866,8 @@
         </p:nvSpPr>
         <p:spPr>
           <a:xfrm>
-            <a:off x="1554480" y="2641871"/>
-            <a:ext cx="10515600" cy="523220"/>
+            <a:off x="838200" y="2032875"/>
+            <a:ext cx="10515600" cy="461665"/>
           </a:xfrm>
           <a:prstGeom prst="rect">
             <a:avLst/>
@@ -9607,51 +9881,209 @@
           <a:lstStyle/>
           <a:p>
             <a:r>
-              <a:rPr lang="en-US" sz="2800" dirty="0"/>
-              <a:t>The accuracy may be higher (but may suffer from overfitting)</a:t>
+              <a:rPr lang="en-US" sz="2400" dirty="0"/>
+              <a:t>Model Bias</a:t>
             </a:r>
           </a:p>
         </p:txBody>
       </p:sp>
-      <p:sp>
-        <p:nvSpPr>
-          <p:cNvPr id="8" name="TextBox 7">
-            <a:extLst>
-              <a:ext uri="{FF2B5EF4-FFF2-40B4-BE49-F238E27FC236}">
-                <a16:creationId xmlns:a16="http://schemas.microsoft.com/office/drawing/2014/main" id="{587BD057-652D-4E49-BD81-2FFEE86B1E31}"/>
-              </a:ext>
-            </a:extLst>
-          </p:cNvPr>
-          <p:cNvSpPr txBox="1"/>
-          <p:nvPr/>
-        </p:nvSpPr>
-        <p:spPr>
-          <a:xfrm>
-            <a:off x="1554480" y="3431300"/>
-            <a:ext cx="10515600" cy="523220"/>
-          </a:xfrm>
-          <a:prstGeom prst="rect">
-            <a:avLst/>
-          </a:prstGeom>
-          <a:noFill/>
-        </p:spPr>
-        <p:txBody>
-          <a:bodyPr wrap="square">
-            <a:spAutoFit/>
-          </a:bodyPr>
-          <a:lstStyle/>
-          <a:p>
-            <a:r>
-              <a:rPr lang="en-US" sz="2800" dirty="0"/>
-              <a:t>The interpretability may be worse (It is easy to interpret linear models)</a:t>
-            </a:r>
-          </a:p>
-        </p:txBody>
-      </p:sp>
+      <mc:AlternateContent xmlns:mc="http://schemas.openxmlformats.org/markup-compatibility/2006">
+        <mc:Choice xmlns:a14="http://schemas.microsoft.com/office/drawing/2010/main" Requires="a14">
+          <p:sp>
+            <p:nvSpPr>
+              <p:cNvPr id="16" name="TextBox 15">
+                <a:extLst>
+                  <a:ext uri="{FF2B5EF4-FFF2-40B4-BE49-F238E27FC236}">
+                    <a16:creationId xmlns:a16="http://schemas.microsoft.com/office/drawing/2014/main" id="{FF45575E-8725-CA4C-AB95-5BF053F8CE57}"/>
+                  </a:ext>
+                </a:extLst>
+              </p:cNvPr>
+              <p:cNvSpPr txBox="1"/>
+              <p:nvPr/>
+            </p:nvSpPr>
+            <p:spPr>
+              <a:xfrm>
+                <a:off x="2240280" y="2032874"/>
+                <a:ext cx="4533900" cy="461665"/>
+              </a:xfrm>
+              <a:prstGeom prst="rect">
+                <a:avLst/>
+              </a:prstGeom>
+              <a:noFill/>
+            </p:spPr>
+            <p:txBody>
+              <a:bodyPr wrap="square">
+                <a:spAutoFit/>
+              </a:bodyPr>
+              <a:lstStyle/>
+              <a:p>
+                <a:pPr/>
+                <a14:m>
+                  <m:oMathPara xmlns:m="http://schemas.openxmlformats.org/officeDocument/2006/math">
+                    <m:oMathParaPr>
+                      <m:jc m:val="centerGroup"/>
+                    </m:oMathParaPr>
+                    <m:oMath xmlns:m="http://schemas.openxmlformats.org/officeDocument/2006/math">
+                      <m:sSub>
+                        <m:sSubPr>
+                          <m:ctrlPr>
+                            <a:rPr lang="en-US" sz="2400" b="0" i="1" smtClean="0">
+                              <a:latin typeface="Cambria Math" panose="02040503050406030204" pitchFamily="18" charset="0"/>
+                            </a:rPr>
+                          </m:ctrlPr>
+                        </m:sSubPr>
+                        <m:e>
+                          <m:r>
+                            <a:rPr lang="en-US" sz="2400" b="0" i="1" smtClean="0">
+                              <a:latin typeface="Cambria Math" panose="02040503050406030204" pitchFamily="18" charset="0"/>
+                            </a:rPr>
+                            <m:t>𝐸</m:t>
+                          </m:r>
+                        </m:e>
+                        <m:sub>
+                          <m:r>
+                            <a:rPr lang="en-US" sz="2400" b="0" i="1" smtClean="0">
+                              <a:latin typeface="Cambria Math" panose="02040503050406030204" pitchFamily="18" charset="0"/>
+                            </a:rPr>
+                            <m:t>𝐷</m:t>
+                          </m:r>
+                        </m:sub>
+                      </m:sSub>
+                      <m:d>
+                        <m:dPr>
+                          <m:begChr m:val="["/>
+                          <m:endChr m:val="]"/>
+                          <m:ctrlPr>
+                            <a:rPr lang="en-US" sz="2400" b="0" i="1" smtClean="0">
+                              <a:latin typeface="Cambria Math" panose="02040503050406030204" pitchFamily="18" charset="0"/>
+                            </a:rPr>
+                          </m:ctrlPr>
+                        </m:dPr>
+                        <m:e>
+                          <m:r>
+                            <a:rPr lang="en-US" sz="2400" b="0" i="1" smtClean="0">
+                              <a:latin typeface="Cambria Math" panose="02040503050406030204" pitchFamily="18" charset="0"/>
+                            </a:rPr>
+                            <m:t>𝑔</m:t>
+                          </m:r>
+                          <m:d>
+                            <m:dPr>
+                              <m:ctrlPr>
+                                <a:rPr lang="en-US" sz="2400" b="0" i="1" smtClean="0">
+                                  <a:latin typeface="Cambria Math" panose="02040503050406030204" pitchFamily="18" charset="0"/>
+                                </a:rPr>
+                              </m:ctrlPr>
+                            </m:dPr>
+                            <m:e>
+                              <m:r>
+                                <a:rPr lang="en-US" sz="2400" b="0" i="1" smtClean="0">
+                                  <a:latin typeface="Cambria Math" panose="02040503050406030204" pitchFamily="18" charset="0"/>
+                                </a:rPr>
+                                <m:t>𝑋</m:t>
+                              </m:r>
+                              <m:r>
+                                <a:rPr lang="en-US" sz="2400" b="0" i="1" smtClean="0">
+                                  <a:latin typeface="Cambria Math" panose="02040503050406030204" pitchFamily="18" charset="0"/>
+                                </a:rPr>
+                                <m:t>;</m:t>
+                              </m:r>
+                              <m:r>
+                                <a:rPr lang="en-US" sz="2400" b="0" i="1" smtClean="0">
+                                  <a:latin typeface="Cambria Math" panose="02040503050406030204" pitchFamily="18" charset="0"/>
+                                </a:rPr>
+                                <m:t>𝐷</m:t>
+                              </m:r>
+                            </m:e>
+                          </m:d>
+                        </m:e>
+                      </m:d>
+                      <m:r>
+                        <a:rPr lang="en-US" sz="2400" b="0" i="1" smtClean="0">
+                          <a:latin typeface="Cambria Math" panose="02040503050406030204" pitchFamily="18" charset="0"/>
+                        </a:rPr>
+                        <m:t> −</m:t>
+                      </m:r>
+                      <m:r>
+                        <a:rPr lang="en-US" sz="2400" b="0" i="1" smtClean="0">
+                          <a:latin typeface="Cambria Math" panose="02040503050406030204" pitchFamily="18" charset="0"/>
+                        </a:rPr>
+                        <m:t>𝑓</m:t>
+                      </m:r>
+                      <m:r>
+                        <a:rPr lang="en-US" sz="2400" b="0" i="1" smtClean="0">
+                          <a:latin typeface="Cambria Math" panose="02040503050406030204" pitchFamily="18" charset="0"/>
+                        </a:rPr>
+                        <m:t>(</m:t>
+                      </m:r>
+                      <m:r>
+                        <a:rPr lang="en-US" sz="2400" b="0" i="1" smtClean="0">
+                          <a:latin typeface="Cambria Math" panose="02040503050406030204" pitchFamily="18" charset="0"/>
+                        </a:rPr>
+                        <m:t>𝑋</m:t>
+                      </m:r>
+                      <m:r>
+                        <a:rPr lang="en-US" sz="2400" b="0" i="1" smtClean="0">
+                          <a:latin typeface="Cambria Math" panose="02040503050406030204" pitchFamily="18" charset="0"/>
+                        </a:rPr>
+                        <m:t>)</m:t>
+                      </m:r>
+                    </m:oMath>
+                  </m:oMathPara>
+                </a14:m>
+                <a:endParaRPr lang="en-US" sz="2400" dirty="0"/>
+              </a:p>
+            </p:txBody>
+          </p:sp>
+        </mc:Choice>
+        <mc:Fallback>
+          <p:sp>
+            <p:nvSpPr>
+              <p:cNvPr id="16" name="TextBox 15">
+                <a:extLst>
+                  <a:ext uri="{FF2B5EF4-FFF2-40B4-BE49-F238E27FC236}">
+                    <a16:creationId xmlns:a16="http://schemas.microsoft.com/office/drawing/2014/main" id="{FF45575E-8725-CA4C-AB95-5BF053F8CE57}"/>
+                  </a:ext>
+                </a:extLst>
+              </p:cNvPr>
+              <p:cNvSpPr txBox="1">
+                <a:spLocks noRot="1" noChangeAspect="1" noMove="1" noResize="1" noEditPoints="1" noAdjustHandles="1" noChangeArrowheads="1" noChangeShapeType="1" noTextEdit="1"/>
+              </p:cNvSpPr>
+              <p:nvPr/>
+            </p:nvSpPr>
+            <p:spPr>
+              <a:xfrm>
+                <a:off x="2240280" y="2032874"/>
+                <a:ext cx="4533900" cy="461665"/>
+              </a:xfrm>
+              <a:prstGeom prst="rect">
+                <a:avLst/>
+              </a:prstGeom>
+              <a:blipFill>
+                <a:blip r:embed="rId3"/>
+                <a:stretch>
+                  <a:fillRect b="-21053"/>
+                </a:stretch>
+              </a:blipFill>
+            </p:spPr>
+            <p:txBody>
+              <a:bodyPr/>
+              <a:lstStyle/>
+              <a:p>
+                <a:r>
+                  <a:rPr lang="en-US">
+                    <a:noFill/>
+                  </a:rPr>
+                  <a:t> </a:t>
+                </a:r>
+              </a:p>
+            </p:txBody>
+          </p:sp>
+        </mc:Fallback>
+      </mc:AlternateContent>
     </p:spTree>
     <p:extLst>
       <p:ext uri="{BB962C8B-B14F-4D97-AF65-F5344CB8AC3E}">
-        <p14:creationId xmlns:p14="http://schemas.microsoft.com/office/powerpoint/2010/main" val="1783230127"/>
+        <p14:creationId xmlns:p14="http://schemas.microsoft.com/office/powerpoint/2010/main" val="4078446686"/>
       </p:ext>
     </p:extLst>
   </p:cSld>
@@ -9700,52 +10132,18 @@
           <a:lstStyle/>
           <a:p>
             <a:r>
-              <a:rPr lang="en-US" dirty="0" err="1"/>
-              <a:t>Goodfit</a:t>
-            </a:r>
-            <a:r>
               <a:rPr lang="en-US" dirty="0"/>
-              <a:t>, Underfit and Overfit</a:t>
+              <a:t>Bias and Variance Trade-off</a:t>
             </a:r>
           </a:p>
         </p:txBody>
       </p:sp>
-      <p:pic>
-        <p:nvPicPr>
-          <p:cNvPr id="3" name="Picture 2">
+      <p:sp>
+        <p:nvSpPr>
+          <p:cNvPr id="6" name="TextBox 5">
             <a:extLst>
               <a:ext uri="{FF2B5EF4-FFF2-40B4-BE49-F238E27FC236}">
-                <a16:creationId xmlns:a16="http://schemas.microsoft.com/office/drawing/2014/main" id="{F754D2B5-ACFC-EF4A-82C8-DA0555B20DDA}"/>
-              </a:ext>
-            </a:extLst>
-          </p:cNvPr>
-          <p:cNvPicPr>
-            <a:picLocks noChangeAspect="1"/>
-          </p:cNvPicPr>
-          <p:nvPr/>
-        </p:nvPicPr>
-        <p:blipFill>
-          <a:blip r:embed="rId2"/>
-          <a:stretch>
-            <a:fillRect/>
-          </a:stretch>
-        </p:blipFill>
-        <p:spPr>
-          <a:xfrm>
-            <a:off x="662939" y="1868488"/>
-            <a:ext cx="11318313" cy="3549650"/>
-          </a:xfrm>
-          <a:prstGeom prst="rect">
-            <a:avLst/>
-          </a:prstGeom>
-        </p:spPr>
-      </p:pic>
-      <p:sp>
-        <p:nvSpPr>
-          <p:cNvPr id="9" name="TextBox 8">
-            <a:extLst>
-              <a:ext uri="{FF2B5EF4-FFF2-40B4-BE49-F238E27FC236}">
-                <a16:creationId xmlns:a16="http://schemas.microsoft.com/office/drawing/2014/main" id="{8854A77D-7B32-2748-B308-389A9B769E6E}"/>
+                <a16:creationId xmlns:a16="http://schemas.microsoft.com/office/drawing/2014/main" id="{0A4ABCA8-D712-A84D-B4FD-C2833F2EB162}"/>
               </a:ext>
             </a:extLst>
           </p:cNvPr>
@@ -9754,8 +10152,8 @@
         </p:nvSpPr>
         <p:spPr>
           <a:xfrm>
-            <a:off x="1582455" y="5595938"/>
-            <a:ext cx="1526505" cy="523220"/>
+            <a:off x="838200" y="1834151"/>
+            <a:ext cx="10515600" cy="523220"/>
           </a:xfrm>
           <a:prstGeom prst="rect">
             <a:avLst/>
@@ -9770,17 +10168,17 @@
           <a:p>
             <a:r>
               <a:rPr lang="en-US" sz="2800" dirty="0"/>
-              <a:t>High bias</a:t>
+              <a:t>If a model is more complicated (e.g., with more parameters):</a:t>
             </a:r>
           </a:p>
         </p:txBody>
       </p:sp>
       <p:sp>
         <p:nvSpPr>
-          <p:cNvPr id="10" name="TextBox 9">
+          <p:cNvPr id="7" name="TextBox 6">
             <a:extLst>
               <a:ext uri="{FF2B5EF4-FFF2-40B4-BE49-F238E27FC236}">
-                <a16:creationId xmlns:a16="http://schemas.microsoft.com/office/drawing/2014/main" id="{6788D3E4-8E8B-AE4B-A3AE-6B3B6B7C9829}"/>
+                <a16:creationId xmlns:a16="http://schemas.microsoft.com/office/drawing/2014/main" id="{7EB2BC32-9BBB-D946-8261-BDC911714E50}"/>
               </a:ext>
             </a:extLst>
           </p:cNvPr>
@@ -9789,8 +10187,8 @@
         </p:nvSpPr>
         <p:spPr>
           <a:xfrm>
-            <a:off x="8943375" y="5595938"/>
-            <a:ext cx="2258025" cy="523220"/>
+            <a:off x="1554480" y="2641871"/>
+            <a:ext cx="10515600" cy="523220"/>
           </a:xfrm>
           <a:prstGeom prst="rect">
             <a:avLst/>
@@ -9805,7 +10203,42 @@
           <a:p>
             <a:r>
               <a:rPr lang="en-US" sz="2800" dirty="0"/>
-              <a:t>High variance</a:t>
+              <a:t>The bias is expected to be smaller</a:t>
+            </a:r>
+          </a:p>
+        </p:txBody>
+      </p:sp>
+      <p:sp>
+        <p:nvSpPr>
+          <p:cNvPr id="8" name="TextBox 7">
+            <a:extLst>
+              <a:ext uri="{FF2B5EF4-FFF2-40B4-BE49-F238E27FC236}">
+                <a16:creationId xmlns:a16="http://schemas.microsoft.com/office/drawing/2014/main" id="{587BD057-652D-4E49-BD81-2FFEE86B1E31}"/>
+              </a:ext>
+            </a:extLst>
+          </p:cNvPr>
+          <p:cNvSpPr txBox="1"/>
+          <p:nvPr/>
+        </p:nvSpPr>
+        <p:spPr>
+          <a:xfrm>
+            <a:off x="1554480" y="3431300"/>
+            <a:ext cx="10515600" cy="523220"/>
+          </a:xfrm>
+          <a:prstGeom prst="rect">
+            <a:avLst/>
+          </a:prstGeom>
+          <a:noFill/>
+        </p:spPr>
+        <p:txBody>
+          <a:bodyPr wrap="square">
+            <a:spAutoFit/>
+          </a:bodyPr>
+          <a:lstStyle/>
+          <a:p>
+            <a:r>
+              <a:rPr lang="en-US" sz="2800" dirty="0"/>
+              <a:t>The variance is expected to be larger</a:t>
             </a:r>
           </a:p>
         </p:txBody>
@@ -9813,7 +10246,7 @@
     </p:spTree>
     <p:extLst>
       <p:ext uri="{BB962C8B-B14F-4D97-AF65-F5344CB8AC3E}">
-        <p14:creationId xmlns:p14="http://schemas.microsoft.com/office/powerpoint/2010/main" val="2008262252"/>
+        <p14:creationId xmlns:p14="http://schemas.microsoft.com/office/powerpoint/2010/main" val="3439712220"/>
       </p:ext>
     </p:extLst>
   </p:cSld>
@@ -9842,10 +10275,38 @@
       </p:grpSpPr>
       <p:sp>
         <p:nvSpPr>
-          <p:cNvPr id="10" name="TextBox 9">
+          <p:cNvPr id="2" name="Title 1">
             <a:extLst>
               <a:ext uri="{FF2B5EF4-FFF2-40B4-BE49-F238E27FC236}">
-                <a16:creationId xmlns:a16="http://schemas.microsoft.com/office/drawing/2014/main" id="{514E73AD-7A38-9D42-8C4C-ADC0FDE0FBC3}"/>
+                <a16:creationId xmlns:a16="http://schemas.microsoft.com/office/drawing/2014/main" id="{5F69E904-77AE-3048-8D9D-BEAC840793F6}"/>
+              </a:ext>
+            </a:extLst>
+          </p:cNvPr>
+          <p:cNvSpPr>
+            <a:spLocks noGrp="1"/>
+          </p:cNvSpPr>
+          <p:nvPr>
+            <p:ph type="title"/>
+          </p:nvPr>
+        </p:nvSpPr>
+        <p:spPr/>
+        <p:txBody>
+          <a:bodyPr/>
+          <a:lstStyle/>
+          <a:p>
+            <a:r>
+              <a:rPr lang="en-US" dirty="0"/>
+              <a:t>Interpretability</a:t>
+            </a:r>
+          </a:p>
+        </p:txBody>
+      </p:sp>
+      <p:sp>
+        <p:nvSpPr>
+          <p:cNvPr id="6" name="TextBox 5">
+            <a:extLst>
+              <a:ext uri="{FF2B5EF4-FFF2-40B4-BE49-F238E27FC236}">
+                <a16:creationId xmlns:a16="http://schemas.microsoft.com/office/drawing/2014/main" id="{0A4ABCA8-D712-A84D-B4FD-C2833F2EB162}"/>
               </a:ext>
             </a:extLst>
           </p:cNvPr>
@@ -9854,8 +10315,8 @@
         </p:nvSpPr>
         <p:spPr>
           <a:xfrm>
-            <a:off x="4792980" y="2601575"/>
-            <a:ext cx="5951220" cy="1077218"/>
+            <a:off x="838200" y="1834151"/>
+            <a:ext cx="10515600" cy="523220"/>
           </a:xfrm>
           <a:prstGeom prst="rect">
             <a:avLst/>
@@ -9869,8 +10330,420 @@
           <a:lstStyle/>
           <a:p>
             <a:r>
-              <a:rPr lang="en-US" sz="6400" dirty="0"/>
-              <a:t>Q &amp; A</a:t>
+              <a:rPr lang="en-US" sz="2800" dirty="0"/>
+              <a:t>The importance of each predictor?</a:t>
+            </a:r>
+          </a:p>
+        </p:txBody>
+      </p:sp>
+      <p:sp>
+        <p:nvSpPr>
+          <p:cNvPr id="9" name="TextBox 8">
+            <a:extLst>
+              <a:ext uri="{FF2B5EF4-FFF2-40B4-BE49-F238E27FC236}">
+                <a16:creationId xmlns:a16="http://schemas.microsoft.com/office/drawing/2014/main" id="{98BCDC1D-C577-DB46-A111-54A3503969B9}"/>
+              </a:ext>
+            </a:extLst>
+          </p:cNvPr>
+          <p:cNvSpPr txBox="1"/>
+          <p:nvPr/>
+        </p:nvSpPr>
+        <p:spPr>
+          <a:xfrm>
+            <a:off x="838200" y="2905780"/>
+            <a:ext cx="10515600" cy="523220"/>
+          </a:xfrm>
+          <a:prstGeom prst="rect">
+            <a:avLst/>
+          </a:prstGeom>
+          <a:noFill/>
+        </p:spPr>
+        <p:txBody>
+          <a:bodyPr wrap="square">
+            <a:spAutoFit/>
+          </a:bodyPr>
+          <a:lstStyle/>
+          <a:p>
+            <a:r>
+              <a:rPr lang="en-US" sz="2800" dirty="0"/>
+              <a:t>Why a model makes a particular decision?</a:t>
+            </a:r>
+          </a:p>
+        </p:txBody>
+      </p:sp>
+      <p:sp>
+        <p:nvSpPr>
+          <p:cNvPr id="10" name="TextBox 9">
+            <a:extLst>
+              <a:ext uri="{FF2B5EF4-FFF2-40B4-BE49-F238E27FC236}">
+                <a16:creationId xmlns:a16="http://schemas.microsoft.com/office/drawing/2014/main" id="{EA4C9EC6-2785-1748-A830-8D79CC3BB873}"/>
+              </a:ext>
+            </a:extLst>
+          </p:cNvPr>
+          <p:cNvSpPr txBox="1"/>
+          <p:nvPr/>
+        </p:nvSpPr>
+        <p:spPr>
+          <a:xfrm>
+            <a:off x="838200" y="3977410"/>
+            <a:ext cx="10515600" cy="523220"/>
+          </a:xfrm>
+          <a:prstGeom prst="rect">
+            <a:avLst/>
+          </a:prstGeom>
+          <a:noFill/>
+        </p:spPr>
+        <p:txBody>
+          <a:bodyPr wrap="square">
+            <a:spAutoFit/>
+          </a:bodyPr>
+          <a:lstStyle/>
+          <a:p>
+            <a:r>
+              <a:rPr lang="en-US" sz="2800" dirty="0"/>
+              <a:t>Example: Linear Model</a:t>
+            </a:r>
+          </a:p>
+        </p:txBody>
+      </p:sp>
+      <mc:AlternateContent xmlns:mc="http://schemas.openxmlformats.org/markup-compatibility/2006">
+        <mc:Choice xmlns:a14="http://schemas.microsoft.com/office/drawing/2010/main" Requires="a14">
+          <p:sp>
+            <p:nvSpPr>
+              <p:cNvPr id="11" name="TextBox 10">
+                <a:extLst>
+                  <a:ext uri="{FF2B5EF4-FFF2-40B4-BE49-F238E27FC236}">
+                    <a16:creationId xmlns:a16="http://schemas.microsoft.com/office/drawing/2014/main" id="{AB425DBC-CA71-584E-8E8C-3831C961321D}"/>
+                  </a:ext>
+                </a:extLst>
+              </p:cNvPr>
+              <p:cNvSpPr txBox="1"/>
+              <p:nvPr/>
+            </p:nvSpPr>
+            <p:spPr>
+              <a:xfrm>
+                <a:off x="640080" y="5049040"/>
+                <a:ext cx="10515600" cy="523220"/>
+              </a:xfrm>
+              <a:prstGeom prst="rect">
+                <a:avLst/>
+              </a:prstGeom>
+              <a:noFill/>
+            </p:spPr>
+            <p:txBody>
+              <a:bodyPr wrap="square">
+                <a:spAutoFit/>
+              </a:bodyPr>
+              <a:lstStyle/>
+              <a:p>
+                <a14:m>
+                  <m:oMathPara xmlns:m="http://schemas.openxmlformats.org/officeDocument/2006/math">
+                    <m:oMathParaPr>
+                      <m:jc m:val="centerGroup"/>
+                    </m:oMathParaPr>
+                    <m:oMath xmlns:m="http://schemas.openxmlformats.org/officeDocument/2006/math">
+                      <m:r>
+                        <a:rPr lang="en-US" sz="2800" b="0" i="1" smtClean="0">
+                          <a:latin typeface="Cambria Math" panose="02040503050406030204" pitchFamily="18" charset="0"/>
+                        </a:rPr>
+                        <m:t>𝐼𝑛𝑐𝑜𝑚𝑒</m:t>
+                      </m:r>
+                      <m:r>
+                        <a:rPr lang="en-US" sz="2800" b="0" i="1" smtClean="0">
+                          <a:latin typeface="Cambria Math" panose="02040503050406030204" pitchFamily="18" charset="0"/>
+                        </a:rPr>
+                        <m:t>=5×</m:t>
+                      </m:r>
+                      <m:r>
+                        <a:rPr lang="en-US" sz="2800" b="0" i="1" smtClean="0">
+                          <a:latin typeface="Cambria Math" panose="02040503050406030204" pitchFamily="18" charset="0"/>
+                        </a:rPr>
+                        <m:t>𝑌𝑒𝑎𝑟</m:t>
+                      </m:r>
+                      <m:r>
+                        <a:rPr lang="en-US" sz="2800" b="0" i="1" smtClean="0">
+                          <a:latin typeface="Cambria Math" panose="02040503050406030204" pitchFamily="18" charset="0"/>
+                        </a:rPr>
+                        <m:t> </m:t>
+                      </m:r>
+                      <m:r>
+                        <a:rPr lang="en-US" sz="2800" b="0" i="1" smtClean="0">
+                          <a:latin typeface="Cambria Math" panose="02040503050406030204" pitchFamily="18" charset="0"/>
+                        </a:rPr>
+                        <m:t>𝑜𝑓</m:t>
+                      </m:r>
+                      <m:r>
+                        <a:rPr lang="en-US" sz="2800" b="0" i="1" smtClean="0">
+                          <a:latin typeface="Cambria Math" panose="02040503050406030204" pitchFamily="18" charset="0"/>
+                        </a:rPr>
+                        <m:t> </m:t>
+                      </m:r>
+                      <m:r>
+                        <a:rPr lang="en-US" sz="2800" b="0" i="1" smtClean="0">
+                          <a:latin typeface="Cambria Math" panose="02040503050406030204" pitchFamily="18" charset="0"/>
+                        </a:rPr>
+                        <m:t>𝑤𝑜𝑟𝑘</m:t>
+                      </m:r>
+                      <m:r>
+                        <a:rPr lang="en-US" sz="2800" b="0" i="1" smtClean="0">
+                          <a:latin typeface="Cambria Math" panose="02040503050406030204" pitchFamily="18" charset="0"/>
+                        </a:rPr>
+                        <m:t>+4×</m:t>
+                      </m:r>
+                      <m:r>
+                        <a:rPr lang="en-US" sz="2800" b="0" i="1" smtClean="0">
+                          <a:latin typeface="Cambria Math" panose="02040503050406030204" pitchFamily="18" charset="0"/>
+                        </a:rPr>
+                        <m:t>𝑌𝑒𝑎𝑟</m:t>
+                      </m:r>
+                      <m:r>
+                        <a:rPr lang="en-US" sz="2800" b="0" i="1" smtClean="0">
+                          <a:latin typeface="Cambria Math" panose="02040503050406030204" pitchFamily="18" charset="0"/>
+                        </a:rPr>
+                        <m:t> </m:t>
+                      </m:r>
+                      <m:r>
+                        <a:rPr lang="en-US" sz="2800" b="0" i="1" smtClean="0">
+                          <a:latin typeface="Cambria Math" panose="02040503050406030204" pitchFamily="18" charset="0"/>
+                        </a:rPr>
+                        <m:t>𝑜𝑓</m:t>
+                      </m:r>
+                      <m:r>
+                        <a:rPr lang="en-US" sz="2800" b="0" i="1" smtClean="0">
+                          <a:latin typeface="Cambria Math" panose="02040503050406030204" pitchFamily="18" charset="0"/>
+                        </a:rPr>
+                        <m:t> </m:t>
+                      </m:r>
+                      <m:r>
+                        <a:rPr lang="en-US" sz="2800" b="0" i="1" smtClean="0">
+                          <a:latin typeface="Cambria Math" panose="02040503050406030204" pitchFamily="18" charset="0"/>
+                        </a:rPr>
+                        <m:t>𝐸𝑑𝑢</m:t>
+                      </m:r>
+                      <m:r>
+                        <a:rPr lang="en-US" sz="2800" b="0" i="1" smtClean="0">
+                          <a:latin typeface="Cambria Math" panose="02040503050406030204" pitchFamily="18" charset="0"/>
+                        </a:rPr>
+                        <m:t>+0.1×</m:t>
+                      </m:r>
+                      <m:r>
+                        <a:rPr lang="en-US" sz="2800" b="0" i="1" smtClean="0">
+                          <a:latin typeface="Cambria Math" panose="02040503050406030204" pitchFamily="18" charset="0"/>
+                        </a:rPr>
+                        <m:t>𝐻𝑒𝑖𝑔h𝑡</m:t>
+                      </m:r>
+                    </m:oMath>
+                  </m:oMathPara>
+                </a14:m>
+                <a:endParaRPr lang="en-US" sz="2800" dirty="0"/>
+              </a:p>
+            </p:txBody>
+          </p:sp>
+        </mc:Choice>
+        <mc:Fallback>
+          <p:sp>
+            <p:nvSpPr>
+              <p:cNvPr id="11" name="TextBox 10">
+                <a:extLst>
+                  <a:ext uri="{FF2B5EF4-FFF2-40B4-BE49-F238E27FC236}">
+                    <a16:creationId xmlns:a16="http://schemas.microsoft.com/office/drawing/2014/main" id="{AB425DBC-CA71-584E-8E8C-3831C961321D}"/>
+                  </a:ext>
+                </a:extLst>
+              </p:cNvPr>
+              <p:cNvSpPr txBox="1">
+                <a:spLocks noRot="1" noChangeAspect="1" noMove="1" noResize="1" noEditPoints="1" noAdjustHandles="1" noChangeArrowheads="1" noChangeShapeType="1" noTextEdit="1"/>
+              </p:cNvSpPr>
+              <p:nvPr/>
+            </p:nvSpPr>
+            <p:spPr>
+              <a:xfrm>
+                <a:off x="640080" y="5049040"/>
+                <a:ext cx="10515600" cy="523220"/>
+              </a:xfrm>
+              <a:prstGeom prst="rect">
+                <a:avLst/>
+              </a:prstGeom>
+              <a:blipFill>
+                <a:blip r:embed="rId2"/>
+                <a:stretch>
+                  <a:fillRect b="-21429"/>
+                </a:stretch>
+              </a:blipFill>
+            </p:spPr>
+            <p:txBody>
+              <a:bodyPr/>
+              <a:lstStyle/>
+              <a:p>
+                <a:r>
+                  <a:rPr lang="en-US">
+                    <a:noFill/>
+                  </a:rPr>
+                  <a:t> </a:t>
+                </a:r>
+              </a:p>
+            </p:txBody>
+          </p:sp>
+        </mc:Fallback>
+      </mc:AlternateContent>
+    </p:spTree>
+    <p:extLst>
+      <p:ext uri="{BB962C8B-B14F-4D97-AF65-F5344CB8AC3E}">
+        <p14:creationId xmlns:p14="http://schemas.microsoft.com/office/powerpoint/2010/main" val="2892434479"/>
+      </p:ext>
+    </p:extLst>
+  </p:cSld>
+  <p:clrMapOvr>
+    <a:masterClrMapping/>
+  </p:clrMapOvr>
+</p:sld>
+</file>
+
+<file path=ppt/slides/slide19.xml><?xml version="1.0" encoding="utf-8"?>
+<p:sld xmlns:a="http://schemas.openxmlformats.org/drawingml/2006/main" xmlns:r="http://schemas.openxmlformats.org/officeDocument/2006/relationships" xmlns:p="http://schemas.openxmlformats.org/presentationml/2006/main">
+  <p:cSld>
+    <p:spTree>
+      <p:nvGrpSpPr>
+        <p:cNvPr id="1" name=""/>
+        <p:cNvGrpSpPr/>
+        <p:nvPr/>
+      </p:nvGrpSpPr>
+      <p:grpSpPr>
+        <a:xfrm>
+          <a:off x="0" y="0"/>
+          <a:ext cx="0" cy="0"/>
+          <a:chOff x="0" y="0"/>
+          <a:chExt cx="0" cy="0"/>
+        </a:xfrm>
+      </p:grpSpPr>
+      <p:sp>
+        <p:nvSpPr>
+          <p:cNvPr id="2" name="Title 1">
+            <a:extLst>
+              <a:ext uri="{FF2B5EF4-FFF2-40B4-BE49-F238E27FC236}">
+                <a16:creationId xmlns:a16="http://schemas.microsoft.com/office/drawing/2014/main" id="{5F69E904-77AE-3048-8D9D-BEAC840793F6}"/>
+              </a:ext>
+            </a:extLst>
+          </p:cNvPr>
+          <p:cNvSpPr>
+            <a:spLocks noGrp="1"/>
+          </p:cNvSpPr>
+          <p:nvPr>
+            <p:ph type="title"/>
+          </p:nvPr>
+        </p:nvSpPr>
+        <p:spPr/>
+        <p:txBody>
+          <a:bodyPr/>
+          <a:lstStyle/>
+          <a:p>
+            <a:r>
+              <a:rPr lang="en-US" dirty="0"/>
+              <a:t>Accuracy and Interpretability Trade-off</a:t>
+            </a:r>
+          </a:p>
+        </p:txBody>
+      </p:sp>
+      <p:sp>
+        <p:nvSpPr>
+          <p:cNvPr id="6" name="TextBox 5">
+            <a:extLst>
+              <a:ext uri="{FF2B5EF4-FFF2-40B4-BE49-F238E27FC236}">
+                <a16:creationId xmlns:a16="http://schemas.microsoft.com/office/drawing/2014/main" id="{0A4ABCA8-D712-A84D-B4FD-C2833F2EB162}"/>
+              </a:ext>
+            </a:extLst>
+          </p:cNvPr>
+          <p:cNvSpPr txBox="1"/>
+          <p:nvPr/>
+        </p:nvSpPr>
+        <p:spPr>
+          <a:xfrm>
+            <a:off x="838200" y="1834151"/>
+            <a:ext cx="10515600" cy="523220"/>
+          </a:xfrm>
+          <a:prstGeom prst="rect">
+            <a:avLst/>
+          </a:prstGeom>
+          <a:noFill/>
+        </p:spPr>
+        <p:txBody>
+          <a:bodyPr wrap="square">
+            <a:spAutoFit/>
+          </a:bodyPr>
+          <a:lstStyle/>
+          <a:p>
+            <a:r>
+              <a:rPr lang="en-US" sz="2800" dirty="0"/>
+              <a:t>If a model is more complicated (e.g., with more parameters):</a:t>
+            </a:r>
+          </a:p>
+        </p:txBody>
+      </p:sp>
+      <p:sp>
+        <p:nvSpPr>
+          <p:cNvPr id="7" name="TextBox 6">
+            <a:extLst>
+              <a:ext uri="{FF2B5EF4-FFF2-40B4-BE49-F238E27FC236}">
+                <a16:creationId xmlns:a16="http://schemas.microsoft.com/office/drawing/2014/main" id="{7EB2BC32-9BBB-D946-8261-BDC911714E50}"/>
+              </a:ext>
+            </a:extLst>
+          </p:cNvPr>
+          <p:cNvSpPr txBox="1"/>
+          <p:nvPr/>
+        </p:nvSpPr>
+        <p:spPr>
+          <a:xfrm>
+            <a:off x="1554480" y="2641871"/>
+            <a:ext cx="10515600" cy="523220"/>
+          </a:xfrm>
+          <a:prstGeom prst="rect">
+            <a:avLst/>
+          </a:prstGeom>
+          <a:noFill/>
+        </p:spPr>
+        <p:txBody>
+          <a:bodyPr wrap="square">
+            <a:spAutoFit/>
+          </a:bodyPr>
+          <a:lstStyle/>
+          <a:p>
+            <a:r>
+              <a:rPr lang="en-US" sz="2800" dirty="0"/>
+              <a:t>The accuracy may be higher (but may suffer from overfitting)</a:t>
+            </a:r>
+          </a:p>
+        </p:txBody>
+      </p:sp>
+      <p:sp>
+        <p:nvSpPr>
+          <p:cNvPr id="8" name="TextBox 7">
+            <a:extLst>
+              <a:ext uri="{FF2B5EF4-FFF2-40B4-BE49-F238E27FC236}">
+                <a16:creationId xmlns:a16="http://schemas.microsoft.com/office/drawing/2014/main" id="{587BD057-652D-4E49-BD81-2FFEE86B1E31}"/>
+              </a:ext>
+            </a:extLst>
+          </p:cNvPr>
+          <p:cNvSpPr txBox="1"/>
+          <p:nvPr/>
+        </p:nvSpPr>
+        <p:spPr>
+          <a:xfrm>
+            <a:off x="1554480" y="3431300"/>
+            <a:ext cx="10515600" cy="523220"/>
+          </a:xfrm>
+          <a:prstGeom prst="rect">
+            <a:avLst/>
+          </a:prstGeom>
+          <a:noFill/>
+        </p:spPr>
+        <p:txBody>
+          <a:bodyPr wrap="square">
+            <a:spAutoFit/>
+          </a:bodyPr>
+          <a:lstStyle/>
+          <a:p>
+            <a:r>
+              <a:rPr lang="en-US" sz="2800" dirty="0"/>
+              <a:t>The interpretability may be worse (It is easy to interpret linear models)</a:t>
             </a:r>
           </a:p>
         </p:txBody>
@@ -9878,7 +10751,7 @@
     </p:spTree>
     <p:extLst>
       <p:ext uri="{BB962C8B-B14F-4D97-AF65-F5344CB8AC3E}">
-        <p14:creationId xmlns:p14="http://schemas.microsoft.com/office/powerpoint/2010/main" val="1613744569"/>
+        <p14:creationId xmlns:p14="http://schemas.microsoft.com/office/powerpoint/2010/main" val="1783230127"/>
       </p:ext>
     </p:extLst>
   </p:cSld>
@@ -10248,6 +11121,291 @@
     <p:extLst>
       <p:ext uri="{BB962C8B-B14F-4D97-AF65-F5344CB8AC3E}">
         <p14:creationId xmlns:p14="http://schemas.microsoft.com/office/powerpoint/2010/main" val="2999229372"/>
+      </p:ext>
+    </p:extLst>
+  </p:cSld>
+  <p:clrMapOvr>
+    <a:masterClrMapping/>
+  </p:clrMapOvr>
+</p:sld>
+</file>
+
+<file path=ppt/slides/slide20.xml><?xml version="1.0" encoding="utf-8"?>
+<p:sld xmlns:a="http://schemas.openxmlformats.org/drawingml/2006/main" xmlns:r="http://schemas.openxmlformats.org/officeDocument/2006/relationships" xmlns:p="http://schemas.openxmlformats.org/presentationml/2006/main">
+  <p:cSld>
+    <p:spTree>
+      <p:nvGrpSpPr>
+        <p:cNvPr id="1" name=""/>
+        <p:cNvGrpSpPr/>
+        <p:nvPr/>
+      </p:nvGrpSpPr>
+      <p:grpSpPr>
+        <a:xfrm>
+          <a:off x="0" y="0"/>
+          <a:ext cx="0" cy="0"/>
+          <a:chOff x="0" y="0"/>
+          <a:chExt cx="0" cy="0"/>
+        </a:xfrm>
+      </p:grpSpPr>
+      <p:sp>
+        <p:nvSpPr>
+          <p:cNvPr id="2" name="Title 1">
+            <a:extLst>
+              <a:ext uri="{FF2B5EF4-FFF2-40B4-BE49-F238E27FC236}">
+                <a16:creationId xmlns:a16="http://schemas.microsoft.com/office/drawing/2014/main" id="{5F69E904-77AE-3048-8D9D-BEAC840793F6}"/>
+              </a:ext>
+            </a:extLst>
+          </p:cNvPr>
+          <p:cNvSpPr>
+            <a:spLocks noGrp="1"/>
+          </p:cNvSpPr>
+          <p:nvPr>
+            <p:ph type="title"/>
+          </p:nvPr>
+        </p:nvSpPr>
+        <p:spPr/>
+        <p:txBody>
+          <a:bodyPr/>
+          <a:lstStyle/>
+          <a:p>
+            <a:r>
+              <a:rPr lang="en-US" dirty="0" err="1"/>
+              <a:t>Goodfit</a:t>
+            </a:r>
+            <a:r>
+              <a:rPr lang="en-US" dirty="0"/>
+              <a:t>, Underfit and Overfit</a:t>
+            </a:r>
+          </a:p>
+        </p:txBody>
+      </p:sp>
+      <p:pic>
+        <p:nvPicPr>
+          <p:cNvPr id="3" name="Picture 2">
+            <a:extLst>
+              <a:ext uri="{FF2B5EF4-FFF2-40B4-BE49-F238E27FC236}">
+                <a16:creationId xmlns:a16="http://schemas.microsoft.com/office/drawing/2014/main" id="{F754D2B5-ACFC-EF4A-82C8-DA0555B20DDA}"/>
+              </a:ext>
+            </a:extLst>
+          </p:cNvPr>
+          <p:cNvPicPr>
+            <a:picLocks noChangeAspect="1"/>
+          </p:cNvPicPr>
+          <p:nvPr/>
+        </p:nvPicPr>
+        <p:blipFill>
+          <a:blip r:embed="rId2"/>
+          <a:stretch>
+            <a:fillRect/>
+          </a:stretch>
+        </p:blipFill>
+        <p:spPr>
+          <a:xfrm>
+            <a:off x="662939" y="1868488"/>
+            <a:ext cx="11318313" cy="3549650"/>
+          </a:xfrm>
+          <a:prstGeom prst="rect">
+            <a:avLst/>
+          </a:prstGeom>
+        </p:spPr>
+      </p:pic>
+      <p:sp>
+        <p:nvSpPr>
+          <p:cNvPr id="9" name="TextBox 8">
+            <a:extLst>
+              <a:ext uri="{FF2B5EF4-FFF2-40B4-BE49-F238E27FC236}">
+                <a16:creationId xmlns:a16="http://schemas.microsoft.com/office/drawing/2014/main" id="{8854A77D-7B32-2748-B308-389A9B769E6E}"/>
+              </a:ext>
+            </a:extLst>
+          </p:cNvPr>
+          <p:cNvSpPr txBox="1"/>
+          <p:nvPr/>
+        </p:nvSpPr>
+        <p:spPr>
+          <a:xfrm>
+            <a:off x="1582455" y="5595938"/>
+            <a:ext cx="1526505" cy="523220"/>
+          </a:xfrm>
+          <a:prstGeom prst="rect">
+            <a:avLst/>
+          </a:prstGeom>
+          <a:noFill/>
+        </p:spPr>
+        <p:txBody>
+          <a:bodyPr wrap="square">
+            <a:spAutoFit/>
+          </a:bodyPr>
+          <a:lstStyle/>
+          <a:p>
+            <a:r>
+              <a:rPr lang="en-US" sz="2800" dirty="0"/>
+              <a:t>High bias</a:t>
+            </a:r>
+          </a:p>
+        </p:txBody>
+      </p:sp>
+      <p:sp>
+        <p:nvSpPr>
+          <p:cNvPr id="10" name="TextBox 9">
+            <a:extLst>
+              <a:ext uri="{FF2B5EF4-FFF2-40B4-BE49-F238E27FC236}">
+                <a16:creationId xmlns:a16="http://schemas.microsoft.com/office/drawing/2014/main" id="{6788D3E4-8E8B-AE4B-A3AE-6B3B6B7C9829}"/>
+              </a:ext>
+            </a:extLst>
+          </p:cNvPr>
+          <p:cNvSpPr txBox="1"/>
+          <p:nvPr/>
+        </p:nvSpPr>
+        <p:spPr>
+          <a:xfrm>
+            <a:off x="8943375" y="5595938"/>
+            <a:ext cx="2258025" cy="523220"/>
+          </a:xfrm>
+          <a:prstGeom prst="rect">
+            <a:avLst/>
+          </a:prstGeom>
+          <a:noFill/>
+        </p:spPr>
+        <p:txBody>
+          <a:bodyPr wrap="square">
+            <a:spAutoFit/>
+          </a:bodyPr>
+          <a:lstStyle/>
+          <a:p>
+            <a:r>
+              <a:rPr lang="en-US" sz="2800" dirty="0"/>
+              <a:t>High variance</a:t>
+            </a:r>
+          </a:p>
+        </p:txBody>
+      </p:sp>
+    </p:spTree>
+    <p:extLst>
+      <p:ext uri="{BB962C8B-B14F-4D97-AF65-F5344CB8AC3E}">
+        <p14:creationId xmlns:p14="http://schemas.microsoft.com/office/powerpoint/2010/main" val="2008262252"/>
+      </p:ext>
+    </p:extLst>
+  </p:cSld>
+  <p:clrMapOvr>
+    <a:masterClrMapping/>
+  </p:clrMapOvr>
+</p:sld>
+</file>
+
+<file path=ppt/slides/slide21.xml><?xml version="1.0" encoding="utf-8"?>
+<p:sld xmlns:a="http://schemas.openxmlformats.org/drawingml/2006/main" xmlns:r="http://schemas.openxmlformats.org/officeDocument/2006/relationships" xmlns:p="http://schemas.openxmlformats.org/presentationml/2006/main">
+  <p:cSld>
+    <p:spTree>
+      <p:nvGrpSpPr>
+        <p:cNvPr id="1" name=""/>
+        <p:cNvGrpSpPr/>
+        <p:nvPr/>
+      </p:nvGrpSpPr>
+      <p:grpSpPr>
+        <a:xfrm>
+          <a:off x="0" y="0"/>
+          <a:ext cx="0" cy="0"/>
+          <a:chOff x="0" y="0"/>
+          <a:chExt cx="0" cy="0"/>
+        </a:xfrm>
+      </p:grpSpPr>
+      <p:sp>
+        <p:nvSpPr>
+          <p:cNvPr id="2" name="Title 1">
+            <a:extLst>
+              <a:ext uri="{FF2B5EF4-FFF2-40B4-BE49-F238E27FC236}">
+                <a16:creationId xmlns:a16="http://schemas.microsoft.com/office/drawing/2014/main" id="{5F69E904-77AE-3048-8D9D-BEAC840793F6}"/>
+              </a:ext>
+            </a:extLst>
+          </p:cNvPr>
+          <p:cNvSpPr>
+            <a:spLocks noGrp="1"/>
+          </p:cNvSpPr>
+          <p:nvPr>
+            <p:ph type="title"/>
+          </p:nvPr>
+        </p:nvSpPr>
+        <p:spPr/>
+        <p:txBody>
+          <a:bodyPr/>
+          <a:lstStyle/>
+          <a:p>
+            <a:r>
+              <a:rPr lang="en-US" dirty="0"/>
+              <a:t>Underfit and Overfit</a:t>
+            </a:r>
+          </a:p>
+        </p:txBody>
+      </p:sp>
+    </p:spTree>
+    <p:extLst>
+      <p:ext uri="{BB962C8B-B14F-4D97-AF65-F5344CB8AC3E}">
+        <p14:creationId xmlns:p14="http://schemas.microsoft.com/office/powerpoint/2010/main" val="376484440"/>
+      </p:ext>
+    </p:extLst>
+  </p:cSld>
+  <p:clrMapOvr>
+    <a:masterClrMapping/>
+  </p:clrMapOvr>
+</p:sld>
+</file>
+
+<file path=ppt/slides/slide22.xml><?xml version="1.0" encoding="utf-8"?>
+<p:sld xmlns:a="http://schemas.openxmlformats.org/drawingml/2006/main" xmlns:r="http://schemas.openxmlformats.org/officeDocument/2006/relationships" xmlns:p="http://schemas.openxmlformats.org/presentationml/2006/main">
+  <p:cSld>
+    <p:spTree>
+      <p:nvGrpSpPr>
+        <p:cNvPr id="1" name=""/>
+        <p:cNvGrpSpPr/>
+        <p:nvPr/>
+      </p:nvGrpSpPr>
+      <p:grpSpPr>
+        <a:xfrm>
+          <a:off x="0" y="0"/>
+          <a:ext cx="0" cy="0"/>
+          <a:chOff x="0" y="0"/>
+          <a:chExt cx="0" cy="0"/>
+        </a:xfrm>
+      </p:grpSpPr>
+      <p:sp>
+        <p:nvSpPr>
+          <p:cNvPr id="10" name="TextBox 9">
+            <a:extLst>
+              <a:ext uri="{FF2B5EF4-FFF2-40B4-BE49-F238E27FC236}">
+                <a16:creationId xmlns:a16="http://schemas.microsoft.com/office/drawing/2014/main" id="{514E73AD-7A38-9D42-8C4C-ADC0FDE0FBC3}"/>
+              </a:ext>
+            </a:extLst>
+          </p:cNvPr>
+          <p:cNvSpPr txBox="1"/>
+          <p:nvPr/>
+        </p:nvSpPr>
+        <p:spPr>
+          <a:xfrm>
+            <a:off x="4792980" y="2601575"/>
+            <a:ext cx="5951220" cy="1077218"/>
+          </a:xfrm>
+          <a:prstGeom prst="rect">
+            <a:avLst/>
+          </a:prstGeom>
+          <a:noFill/>
+        </p:spPr>
+        <p:txBody>
+          <a:bodyPr wrap="square">
+            <a:spAutoFit/>
+          </a:bodyPr>
+          <a:lstStyle/>
+          <a:p>
+            <a:r>
+              <a:rPr lang="en-US" sz="6400" dirty="0"/>
+              <a:t>Q &amp; A</a:t>
+            </a:r>
+          </a:p>
+        </p:txBody>
+      </p:sp>
+    </p:spTree>
+    <p:extLst>
+      <p:ext uri="{BB962C8B-B14F-4D97-AF65-F5344CB8AC3E}">
+        <p14:creationId xmlns:p14="http://schemas.microsoft.com/office/powerpoint/2010/main" val="1613744569"/>
       </p:ext>
     </p:extLst>
   </p:cSld>

</xml_diff>

<commit_message>
correct few mistakes in lecture 2
</commit_message>
<xml_diff>
--- a/_umkc-teaching/slides/Lecture2 - Statistical Learning.pptx
+++ b/_umkc-teaching/slides/Lecture2 - Statistical Learning.pptx
@@ -220,7 +220,7 @@
           <a:p>
             <a:fld id="{7AF9442D-9D7C-40D7-A5A3-649EA8C158D2}" type="datetimeFigureOut">
               <a:rPr lang="en-US" smtClean="0"/>
-              <a:t>8/25/23</a:t>
+              <a:t>8/28/23</a:t>
             </a:fld>
             <a:endParaRPr lang="en-US"/>
           </a:p>
@@ -1288,7 +1288,7 @@
           <a:p>
             <a:fld id="{41748473-9145-41F0-ADB9-654A949CD218}" type="datetimeFigureOut">
               <a:rPr lang="en-US" smtClean="0"/>
-              <a:t>8/25/23</a:t>
+              <a:t>8/28/23</a:t>
             </a:fld>
             <a:endParaRPr lang="en-US"/>
           </a:p>
@@ -1456,7 +1456,7 @@
           <a:p>
             <a:fld id="{41748473-9145-41F0-ADB9-654A949CD218}" type="datetimeFigureOut">
               <a:rPr lang="en-US" smtClean="0"/>
-              <a:t>8/25/23</a:t>
+              <a:t>8/28/23</a:t>
             </a:fld>
             <a:endParaRPr lang="en-US"/>
           </a:p>
@@ -1634,7 +1634,7 @@
           <a:p>
             <a:fld id="{41748473-9145-41F0-ADB9-654A949CD218}" type="datetimeFigureOut">
               <a:rPr lang="en-US" smtClean="0"/>
-              <a:t>8/25/23</a:t>
+              <a:t>8/28/23</a:t>
             </a:fld>
             <a:endParaRPr lang="en-US"/>
           </a:p>
@@ -1802,7 +1802,7 @@
           <a:p>
             <a:fld id="{41748473-9145-41F0-ADB9-654A949CD218}" type="datetimeFigureOut">
               <a:rPr lang="en-US" smtClean="0"/>
-              <a:t>8/25/23</a:t>
+              <a:t>8/28/23</a:t>
             </a:fld>
             <a:endParaRPr lang="en-US"/>
           </a:p>
@@ -2047,7 +2047,7 @@
           <a:p>
             <a:fld id="{41748473-9145-41F0-ADB9-654A949CD218}" type="datetimeFigureOut">
               <a:rPr lang="en-US" smtClean="0"/>
-              <a:t>8/25/23</a:t>
+              <a:t>8/28/23</a:t>
             </a:fld>
             <a:endParaRPr lang="en-US"/>
           </a:p>
@@ -2276,7 +2276,7 @@
           <a:p>
             <a:fld id="{41748473-9145-41F0-ADB9-654A949CD218}" type="datetimeFigureOut">
               <a:rPr lang="en-US" smtClean="0"/>
-              <a:t>8/25/23</a:t>
+              <a:t>8/28/23</a:t>
             </a:fld>
             <a:endParaRPr lang="en-US"/>
           </a:p>
@@ -2640,7 +2640,7 @@
           <a:p>
             <a:fld id="{41748473-9145-41F0-ADB9-654A949CD218}" type="datetimeFigureOut">
               <a:rPr lang="en-US" smtClean="0"/>
-              <a:t>8/25/23</a:t>
+              <a:t>8/28/23</a:t>
             </a:fld>
             <a:endParaRPr lang="en-US"/>
           </a:p>
@@ -2757,7 +2757,7 @@
           <a:p>
             <a:fld id="{41748473-9145-41F0-ADB9-654A949CD218}" type="datetimeFigureOut">
               <a:rPr lang="en-US" smtClean="0"/>
-              <a:t>8/25/23</a:t>
+              <a:t>8/28/23</a:t>
             </a:fld>
             <a:endParaRPr lang="en-US"/>
           </a:p>
@@ -2852,7 +2852,7 @@
           <a:p>
             <a:fld id="{41748473-9145-41F0-ADB9-654A949CD218}" type="datetimeFigureOut">
               <a:rPr lang="en-US" smtClean="0"/>
-              <a:t>8/25/23</a:t>
+              <a:t>8/28/23</a:t>
             </a:fld>
             <a:endParaRPr lang="en-US"/>
           </a:p>
@@ -3127,7 +3127,7 @@
           <a:p>
             <a:fld id="{41748473-9145-41F0-ADB9-654A949CD218}" type="datetimeFigureOut">
               <a:rPr lang="en-US" smtClean="0"/>
-              <a:t>8/25/23</a:t>
+              <a:t>8/28/23</a:t>
             </a:fld>
             <a:endParaRPr lang="en-US"/>
           </a:p>
@@ -3379,7 +3379,7 @@
           <a:p>
             <a:fld id="{41748473-9145-41F0-ADB9-654A949CD218}" type="datetimeFigureOut">
               <a:rPr lang="en-US" smtClean="0"/>
-              <a:t>8/25/23</a:t>
+              <a:t>8/28/23</a:t>
             </a:fld>
             <a:endParaRPr lang="en-US"/>
           </a:p>
@@ -3590,7 +3590,7 @@
           <a:p>
             <a:fld id="{41748473-9145-41F0-ADB9-654A949CD218}" type="datetimeFigureOut">
               <a:rPr lang="en-US" smtClean="0"/>
-              <a:t>8/25/23</a:t>
+              <a:t>8/28/23</a:t>
             </a:fld>
             <a:endParaRPr lang="en-US"/>
           </a:p>
@@ -4291,8 +4291,8 @@
           </a:p>
         </p:txBody>
       </p:sp>
-      <mc:AlternateContent xmlns:mc="http://schemas.openxmlformats.org/markup-compatibility/2006">
-        <mc:Choice xmlns:a14="http://schemas.microsoft.com/office/drawing/2010/main" Requires="a14">
+      <mc:AlternateContent xmlns:mc="http://schemas.openxmlformats.org/markup-compatibility/2006" xmlns:a14="http://schemas.microsoft.com/office/drawing/2010/main">
+        <mc:Choice Requires="a14">
           <p:sp>
             <p:nvSpPr>
               <p:cNvPr id="4" name="TextBox 3">
@@ -4632,7 +4632,7 @@
             </p:txBody>
           </p:sp>
         </mc:Choice>
-        <mc:Fallback>
+        <mc:Fallback xmlns="">
           <p:sp>
             <p:nvSpPr>
               <p:cNvPr id="4" name="TextBox 3">
@@ -5720,8 +5720,8 @@
           </a:p>
         </p:txBody>
       </p:sp>
-      <mc:AlternateContent xmlns:mc="http://schemas.openxmlformats.org/markup-compatibility/2006">
-        <mc:Choice xmlns:a14="http://schemas.microsoft.com/office/drawing/2010/main" Requires="a14">
+      <mc:AlternateContent xmlns:mc="http://schemas.openxmlformats.org/markup-compatibility/2006" xmlns:a14="http://schemas.microsoft.com/office/drawing/2010/main">
+        <mc:Choice Requires="a14">
           <p:sp>
             <p:nvSpPr>
               <p:cNvPr id="10" name="TextBox 9">
@@ -5774,7 +5774,7 @@
             </p:txBody>
           </p:sp>
         </mc:Choice>
-        <mc:Fallback>
+        <mc:Fallback xmlns="">
           <p:sp>
             <p:nvSpPr>
               <p:cNvPr id="10" name="TextBox 9">
@@ -5819,8 +5819,8 @@
           </p:sp>
         </mc:Fallback>
       </mc:AlternateContent>
-      <mc:AlternateContent xmlns:mc="http://schemas.openxmlformats.org/markup-compatibility/2006" xmlns:a14="http://schemas.microsoft.com/office/drawing/2010/main">
-        <mc:Choice Requires="a14">
+      <mc:AlternateContent xmlns:mc="http://schemas.openxmlformats.org/markup-compatibility/2006">
+        <mc:Choice xmlns:a14="http://schemas.microsoft.com/office/drawing/2010/main" Requires="a14">
           <p:sp>
             <p:nvSpPr>
               <p:cNvPr id="12" name="TextBox 11">
@@ -5953,14 +5953,14 @@
                     <m:sSup>
                       <m:sSupPr>
                         <m:ctrlPr>
-                          <a:rPr lang="en-US" sz="2400" b="0" i="1" smtClean="0">
+                          <a:rPr lang="en-US" sz="2400" i="1">
                             <a:latin typeface="Cambria Math" panose="02040503050406030204" pitchFamily="18" charset="0"/>
                           </a:rPr>
                         </m:ctrlPr>
                       </m:sSupPr>
                       <m:e>
                         <m:r>
-                          <a:rPr lang="en-US" sz="2400" b="0" i="1" smtClean="0">
+                          <a:rPr lang="en-US" sz="2400" i="1">
                             <a:latin typeface="Cambria Math" panose="02040503050406030204" pitchFamily="18" charset="0"/>
                           </a:rPr>
                           <m:t>𝜖</m:t>
@@ -5968,7 +5968,7 @@
                       </m:e>
                       <m:sup>
                         <m:r>
-                          <a:rPr lang="en-US" sz="2400" b="0" i="1" smtClean="0">
+                          <a:rPr lang="en-US" sz="2400" i="1">
                             <a:latin typeface="Cambria Math" panose="02040503050406030204" pitchFamily="18" charset="0"/>
                           </a:rPr>
                           <m:t>2</m:t>
@@ -5976,7 +5976,69 @@
                       </m:sup>
                     </m:sSup>
                     <m:r>
-                      <a:rPr lang="en-US" sz="2400" b="0" i="1" smtClean="0">
+                      <a:rPr lang="en-US" sz="2400" i="1">
+                        <a:latin typeface="Cambria Math" panose="02040503050406030204" pitchFamily="18" charset="0"/>
+                      </a:rPr>
+                      <m:t>+</m:t>
+                    </m:r>
+                    <m:r>
+                      <a:rPr lang="en-US" sz="2400" i="1">
+                        <a:latin typeface="Cambria Math" panose="02040503050406030204" pitchFamily="18" charset="0"/>
+                      </a:rPr>
+                      <m:t>2</m:t>
+                    </m:r>
+                    <m:r>
+                      <a:rPr lang="en-US" sz="2400" i="1">
+                        <a:latin typeface="Cambria Math" panose="02040503050406030204" pitchFamily="18" charset="0"/>
+                      </a:rPr>
+                      <m:t>𝜖</m:t>
+                    </m:r>
+                    <m:sSub>
+                      <m:sSubPr>
+                        <m:ctrlPr>
+                          <a:rPr lang="en-US" sz="2400" i="1">
+                            <a:latin typeface="Cambria Math" panose="02040503050406030204" pitchFamily="18" charset="0"/>
+                          </a:rPr>
+                        </m:ctrlPr>
+                      </m:sSubPr>
+                      <m:e>
+                        <m:r>
+                          <a:rPr lang="en-US" sz="2400" i="1">
+                            <a:latin typeface="Cambria Math" panose="02040503050406030204" pitchFamily="18" charset="0"/>
+                          </a:rPr>
+                          <m:t>𝐸</m:t>
+                        </m:r>
+                      </m:e>
+                      <m:sub>
+                        <m:r>
+                          <a:rPr lang="en-US" sz="2400" i="1">
+                            <a:latin typeface="Cambria Math" panose="02040503050406030204" pitchFamily="18" charset="0"/>
+                          </a:rPr>
+                          <m:t>𝐷</m:t>
+                        </m:r>
+                      </m:sub>
+                    </m:sSub>
+                    <m:d>
+                      <m:dPr>
+                        <m:begChr m:val="["/>
+                        <m:endChr m:val="]"/>
+                        <m:ctrlPr>
+                          <a:rPr lang="en-US" sz="2400" i="1">
+                            <a:latin typeface="Cambria Math" panose="02040503050406030204" pitchFamily="18" charset="0"/>
+                          </a:rPr>
+                        </m:ctrlPr>
+                      </m:dPr>
+                      <m:e>
+                        <m:r>
+                          <a:rPr lang="en-US" sz="2400" i="1">
+                            <a:latin typeface="Cambria Math" panose="02040503050406030204" pitchFamily="18" charset="0"/>
+                          </a:rPr>
+                          <m:t>𝑒</m:t>
+                        </m:r>
+                      </m:e>
+                    </m:d>
+                    <m:r>
+                      <a:rPr lang="en-US" sz="2400" i="1">
                         <a:latin typeface="Cambria Math" panose="02040503050406030204" pitchFamily="18" charset="0"/>
                       </a:rPr>
                       <m:t>+</m:t>
@@ -5984,14 +6046,14 @@
                     <m:sSub>
                       <m:sSubPr>
                         <m:ctrlPr>
-                          <a:rPr lang="en-US" sz="2400" b="0" i="1" smtClean="0">
+                          <a:rPr lang="en-US" sz="2400" i="1">
                             <a:latin typeface="Cambria Math" panose="02040503050406030204" pitchFamily="18" charset="0"/>
                           </a:rPr>
                         </m:ctrlPr>
                       </m:sSubPr>
                       <m:e>
                         <m:r>
-                          <a:rPr lang="en-US" sz="2400" b="0" i="1" smtClean="0">
+                          <a:rPr lang="en-US" sz="2400" i="1">
                             <a:latin typeface="Cambria Math" panose="02040503050406030204" pitchFamily="18" charset="0"/>
                           </a:rPr>
                           <m:t>𝐸</m:t>
@@ -5999,7 +6061,7 @@
                       </m:e>
                       <m:sub>
                         <m:r>
-                          <a:rPr lang="en-US" sz="2400" b="0" i="1" smtClean="0">
+                          <a:rPr lang="en-US" sz="2400" i="1">
                             <a:latin typeface="Cambria Math" panose="02040503050406030204" pitchFamily="18" charset="0"/>
                           </a:rPr>
                           <m:t>𝐷</m:t>
@@ -6007,7 +6069,7 @@
                       </m:sub>
                     </m:sSub>
                     <m:r>
-                      <a:rPr lang="en-US" sz="2400" b="0" i="1" smtClean="0">
+                      <a:rPr lang="en-US" sz="2400" i="1">
                         <a:latin typeface="Cambria Math" panose="02040503050406030204" pitchFamily="18" charset="0"/>
                       </a:rPr>
                       <m:t>[</m:t>
@@ -6015,14 +6077,14 @@
                     <m:sSup>
                       <m:sSupPr>
                         <m:ctrlPr>
-                          <a:rPr lang="en-US" sz="2400" b="0" i="1" smtClean="0">
+                          <a:rPr lang="en-US" sz="2400" i="1">
                             <a:latin typeface="Cambria Math" panose="02040503050406030204" pitchFamily="18" charset="0"/>
                           </a:rPr>
                         </m:ctrlPr>
                       </m:sSupPr>
                       <m:e>
                         <m:r>
-                          <a:rPr lang="en-US" sz="2400" b="0" i="1" smtClean="0">
+                          <a:rPr lang="en-US" sz="2400" i="1">
                             <a:latin typeface="Cambria Math" panose="02040503050406030204" pitchFamily="18" charset="0"/>
                           </a:rPr>
                           <m:t>𝑒</m:t>
@@ -6030,7 +6092,7 @@
                       </m:e>
                       <m:sup>
                         <m:r>
-                          <a:rPr lang="en-US" sz="2400" b="0" i="1" smtClean="0">
+                          <a:rPr lang="en-US" sz="2400" i="1">
                             <a:latin typeface="Cambria Math" panose="02040503050406030204" pitchFamily="18" charset="0"/>
                           </a:rPr>
                           <m:t>2</m:t>
@@ -6038,7 +6100,7 @@
                       </m:sup>
                     </m:sSup>
                     <m:r>
-                      <a:rPr lang="en-US" sz="2400" b="0" i="1" smtClean="0">
+                      <a:rPr lang="en-US" sz="2400" i="1">
                         <a:latin typeface="Cambria Math" panose="02040503050406030204" pitchFamily="18" charset="0"/>
                       </a:rPr>
                       <m:t>]</m:t>
@@ -6047,7 +6109,7 @@
                 </a14:m>
                 <a:r>
                   <a:rPr lang="en-US" sz="2400" dirty="0"/>
-                  <a:t>     irreducible error + reducible error</a:t>
+                  <a:t> irreducible error + reducible error</a:t>
                 </a:r>
               </a:p>
               <a:p>
@@ -6056,7 +6118,7 @@
             </p:txBody>
           </p:sp>
         </mc:Choice>
-        <mc:Fallback xmlns="">
+        <mc:Fallback>
           <p:sp>
             <p:nvSpPr>
               <p:cNvPr id="12" name="TextBox 11">
@@ -6701,8 +6763,8 @@
           </a:p>
         </p:txBody>
       </p:sp>
-      <mc:AlternateContent xmlns:mc="http://schemas.openxmlformats.org/markup-compatibility/2006" xmlns:a14="http://schemas.microsoft.com/office/drawing/2010/main">
-        <mc:Choice Requires="a14">
+      <mc:AlternateContent xmlns:mc="http://schemas.openxmlformats.org/markup-compatibility/2006">
+        <mc:Choice xmlns:a14="http://schemas.microsoft.com/office/drawing/2010/main" Requires="a14">
           <p:sp>
             <p:nvSpPr>
               <p:cNvPr id="18" name="TextBox 17">
@@ -6741,7 +6803,7 @@
                       <m:sSub>
                         <m:sSubPr>
                           <m:ctrlPr>
-                            <a:rPr lang="en-US" sz="2400" b="0" i="1" smtClean="0">
+                            <a:rPr lang="en-US" sz="2400" i="1" dirty="0">
                               <a:latin typeface="Cambria Math" panose="02040503050406030204" pitchFamily="18" charset="0"/>
                             </a:rPr>
                           </m:ctrlPr>
@@ -6750,139 +6812,173 @@
                           <m:sSub>
                             <m:sSubPr>
                               <m:ctrlPr>
-                                <a:rPr lang="en-US" sz="2400" b="0" i="1" smtClean="0">
+                                <a:rPr lang="en-US" sz="2400" i="1" dirty="0">
                                   <a:latin typeface="Cambria Math" panose="02040503050406030204" pitchFamily="18" charset="0"/>
                                 </a:rPr>
                               </m:ctrlPr>
                             </m:sSubPr>
                             <m:e>
                               <m:r>
-                                <a:rPr lang="en-US" sz="2400" b="0" i="1" smtClean="0">
+                                <m:rPr>
+                                  <m:sty m:val="p"/>
+                                </m:rPr>
+                                <a:rPr lang="en-US" sz="2400" dirty="0">
                                   <a:latin typeface="Cambria Math" panose="02040503050406030204" pitchFamily="18" charset="0"/>
                                 </a:rPr>
-                                <m:t>𝐸</m:t>
+                                <m:t>E</m:t>
                               </m:r>
                             </m:e>
                             <m:sub>
                               <m:r>
-                                <a:rPr lang="en-US" sz="2400" b="0" i="1" smtClean="0">
+                                <m:rPr>
+                                  <m:sty m:val="p"/>
+                                </m:rPr>
+                                <a:rPr lang="en-US" sz="2400" dirty="0">
                                   <a:latin typeface="Cambria Math" panose="02040503050406030204" pitchFamily="18" charset="0"/>
                                 </a:rPr>
-                                <m:t>𝐷</m:t>
+                                <m:t>D</m:t>
                               </m:r>
                             </m:sub>
                           </m:sSub>
                           <m:r>
-                            <a:rPr lang="en-US" sz="2400" b="0" i="1" smtClean="0">
+                            <a:rPr lang="en-US" sz="2400" dirty="0">
                               <a:latin typeface="Cambria Math" panose="02040503050406030204" pitchFamily="18" charset="0"/>
                             </a:rPr>
-                            <m:t>[</m:t>
+                            <m:t>[(</m:t>
                           </m:r>
                           <m:r>
-                            <a:rPr lang="en-US" sz="2400" b="0" i="1" smtClean="0">
+                            <m:rPr>
+                              <m:sty m:val="p"/>
+                            </m:rPr>
+                            <a:rPr lang="en-US" sz="2400" dirty="0">
                               <a:latin typeface="Cambria Math" panose="02040503050406030204" pitchFamily="18" charset="0"/>
                             </a:rPr>
-                            <m:t>𝐸</m:t>
+                            <m:t>E</m:t>
                           </m:r>
                         </m:e>
                         <m:sub>
                           <m:r>
-                            <a:rPr lang="en-US" sz="2400" b="0" i="1" smtClean="0">
+                            <a:rPr lang="en-US" sz="2400" i="1" dirty="0">
                               <a:latin typeface="Cambria Math" panose="02040503050406030204" pitchFamily="18" charset="0"/>
                             </a:rPr>
                             <m:t>𝐷</m:t>
                           </m:r>
                         </m:sub>
                       </m:sSub>
-                      <m:d>
-                        <m:dPr>
-                          <m:begChr m:val="["/>
-                          <m:endChr m:val="]"/>
+                      <m:sSup>
+                        <m:sSupPr>
                           <m:ctrlPr>
-                            <a:rPr lang="en-US" sz="2400" b="0" i="1" smtClean="0">
+                            <a:rPr lang="en-US" sz="2400" i="1" dirty="0">
                               <a:latin typeface="Cambria Math" panose="02040503050406030204" pitchFamily="18" charset="0"/>
                             </a:rPr>
                           </m:ctrlPr>
-                        </m:dPr>
+                        </m:sSupPr>
                         <m:e>
-                          <m:r>
-                            <a:rPr lang="en-US" sz="2400" b="0" i="1" smtClean="0">
-                              <a:latin typeface="Cambria Math" panose="02040503050406030204" pitchFamily="18" charset="0"/>
-                            </a:rPr>
-                            <m:t>𝑔</m:t>
-                          </m:r>
                           <m:d>
                             <m:dPr>
+                              <m:begChr m:val="["/>
+                              <m:endChr m:val="]"/>
                               <m:ctrlPr>
-                                <a:rPr lang="en-US" sz="2400" b="0" i="1" smtClean="0">
+                                <a:rPr lang="en-US" sz="2400" i="1">
                                   <a:latin typeface="Cambria Math" panose="02040503050406030204" pitchFamily="18" charset="0"/>
                                 </a:rPr>
                               </m:ctrlPr>
                             </m:dPr>
                             <m:e>
                               <m:r>
-                                <a:rPr lang="en-US" sz="2400" b="0" i="1" smtClean="0">
+                                <a:rPr lang="en-US" sz="2400" i="1">
                                   <a:latin typeface="Cambria Math" panose="02040503050406030204" pitchFamily="18" charset="0"/>
                                 </a:rPr>
-                                <m:t>𝑋</m:t>
+                                <m:t>𝑔</m:t>
                               </m:r>
-                              <m:r>
-                                <a:rPr lang="en-US" sz="2400" b="0" i="1" smtClean="0">
-                                  <a:latin typeface="Cambria Math" panose="02040503050406030204" pitchFamily="18" charset="0"/>
-                                </a:rPr>
-                                <m:t>;</m:t>
-                              </m:r>
-                              <m:r>
-                                <a:rPr lang="en-US" sz="2400" b="0" i="1" smtClean="0">
-                                  <a:latin typeface="Cambria Math" panose="02040503050406030204" pitchFamily="18" charset="0"/>
-                                </a:rPr>
-                                <m:t>𝐷</m:t>
-                              </m:r>
+                              <m:d>
+                                <m:dPr>
+                                  <m:ctrlPr>
+                                    <a:rPr lang="en-US" sz="2400" i="1">
+                                      <a:latin typeface="Cambria Math" panose="02040503050406030204" pitchFamily="18" charset="0"/>
+                                    </a:rPr>
+                                  </m:ctrlPr>
+                                </m:dPr>
+                                <m:e>
+                                  <m:r>
+                                    <a:rPr lang="en-US" sz="2400" i="1">
+                                      <a:latin typeface="Cambria Math" panose="02040503050406030204" pitchFamily="18" charset="0"/>
+                                    </a:rPr>
+                                    <m:t>𝑋</m:t>
+                                  </m:r>
+                                  <m:r>
+                                    <a:rPr lang="en-US" sz="2400" i="1">
+                                      <a:latin typeface="Cambria Math" panose="02040503050406030204" pitchFamily="18" charset="0"/>
+                                    </a:rPr>
+                                    <m:t>;</m:t>
+                                  </m:r>
+                                  <m:r>
+                                    <a:rPr lang="en-US" sz="2400" i="1">
+                                      <a:latin typeface="Cambria Math" panose="02040503050406030204" pitchFamily="18" charset="0"/>
+                                    </a:rPr>
+                                    <m:t>𝐷</m:t>
+                                  </m:r>
+                                </m:e>
+                              </m:d>
                             </m:e>
                           </m:d>
+                          <m:r>
+                            <a:rPr lang="en-US" sz="2400" i="1">
+                              <a:latin typeface="Cambria Math" panose="02040503050406030204" pitchFamily="18" charset="0"/>
+                            </a:rPr>
+                            <m:t> −</m:t>
+                          </m:r>
+                          <m:r>
+                            <a:rPr lang="en-US" sz="2400" i="1">
+                              <a:latin typeface="Cambria Math" panose="02040503050406030204" pitchFamily="18" charset="0"/>
+                            </a:rPr>
+                            <m:t>𝑔</m:t>
+                          </m:r>
+                          <m:r>
+                            <a:rPr lang="en-US" sz="2400" i="1">
+                              <a:latin typeface="Cambria Math" panose="02040503050406030204" pitchFamily="18" charset="0"/>
+                            </a:rPr>
+                            <m:t>(</m:t>
+                          </m:r>
+                          <m:r>
+                            <a:rPr lang="en-US" sz="2400" i="1">
+                              <a:latin typeface="Cambria Math" panose="02040503050406030204" pitchFamily="18" charset="0"/>
+                            </a:rPr>
+                            <m:t>𝑋</m:t>
+                          </m:r>
+                          <m:r>
+                            <a:rPr lang="en-US" sz="2400" i="1">
+                              <a:latin typeface="Cambria Math" panose="02040503050406030204" pitchFamily="18" charset="0"/>
+                            </a:rPr>
+                            <m:t>;</m:t>
+                          </m:r>
+                          <m:r>
+                            <a:rPr lang="en-US" sz="2400" i="1">
+                              <a:latin typeface="Cambria Math" panose="02040503050406030204" pitchFamily="18" charset="0"/>
+                            </a:rPr>
+                            <m:t>𝐷</m:t>
+                          </m:r>
+                          <m:r>
+                            <a:rPr lang="en-US" sz="2400" i="1">
+                              <a:latin typeface="Cambria Math" panose="02040503050406030204" pitchFamily="18" charset="0"/>
+                            </a:rPr>
+                            <m:t>))</m:t>
+                          </m:r>
                         </m:e>
-                      </m:d>
+                        <m:sup>
+                          <m:r>
+                            <a:rPr lang="en-US" sz="2400" i="1" dirty="0">
+                              <a:latin typeface="Cambria Math" panose="02040503050406030204" pitchFamily="18" charset="0"/>
+                            </a:rPr>
+                            <m:t>2</m:t>
+                          </m:r>
+                        </m:sup>
+                      </m:sSup>
                       <m:r>
-                        <a:rPr lang="en-US" sz="2400" b="0" i="1" smtClean="0">
+                        <a:rPr lang="en-US" sz="2400" i="1">
                           <a:latin typeface="Cambria Math" panose="02040503050406030204" pitchFamily="18" charset="0"/>
                         </a:rPr>
-                        <m:t> −</m:t>
-                      </m:r>
-                      <m:r>
-                        <a:rPr lang="en-US" sz="2400" b="0" i="1" smtClean="0">
-                          <a:latin typeface="Cambria Math" panose="02040503050406030204" pitchFamily="18" charset="0"/>
-                        </a:rPr>
-                        <m:t>𝑔</m:t>
-                      </m:r>
-                      <m:r>
-                        <a:rPr lang="en-US" sz="2400" b="0" i="1" smtClean="0">
-                          <a:latin typeface="Cambria Math" panose="02040503050406030204" pitchFamily="18" charset="0"/>
-                        </a:rPr>
-                        <m:t>(</m:t>
-                      </m:r>
-                      <m:r>
-                        <a:rPr lang="en-US" sz="2400" b="0" i="1" smtClean="0">
-                          <a:latin typeface="Cambria Math" panose="02040503050406030204" pitchFamily="18" charset="0"/>
-                        </a:rPr>
-                        <m:t>𝑋</m:t>
-                      </m:r>
-                      <m:r>
-                        <a:rPr lang="en-US" sz="2400" b="0" i="1" smtClean="0">
-                          <a:latin typeface="Cambria Math" panose="02040503050406030204" pitchFamily="18" charset="0"/>
-                        </a:rPr>
-                        <m:t>;</m:t>
-                      </m:r>
-                      <m:r>
-                        <a:rPr lang="en-US" sz="2400" b="0" i="1" smtClean="0">
-                          <a:latin typeface="Cambria Math" panose="02040503050406030204" pitchFamily="18" charset="0"/>
-                        </a:rPr>
-                        <m:t>𝐷</m:t>
-                      </m:r>
-                      <m:r>
-                        <a:rPr lang="en-US" sz="2400" b="0" i="1" smtClean="0">
-                          <a:latin typeface="Cambria Math" panose="02040503050406030204" pitchFamily="18" charset="0"/>
-                        </a:rPr>
-                        <m:t>)]</m:t>
+                        <m:t>]</m:t>
                       </m:r>
                     </m:oMath>
                   </m:oMathPara>
@@ -6892,7 +6988,7 @@
             </p:txBody>
           </p:sp>
         </mc:Choice>
-        <mc:Fallback xmlns="">
+        <mc:Fallback>
           <p:sp>
             <p:nvSpPr>
               <p:cNvPr id="18" name="TextBox 17">
@@ -8129,8 +8225,8 @@
           </a:p>
         </p:txBody>
       </p:sp>
-      <mc:AlternateContent xmlns:mc="http://schemas.openxmlformats.org/markup-compatibility/2006">
-        <mc:Choice xmlns:a14="http://schemas.microsoft.com/office/drawing/2010/main" Requires="a14">
+      <mc:AlternateContent xmlns:mc="http://schemas.openxmlformats.org/markup-compatibility/2006" xmlns:a14="http://schemas.microsoft.com/office/drawing/2010/main">
+        <mc:Choice Requires="a14">
           <p:sp>
             <p:nvSpPr>
               <p:cNvPr id="8" name="TextBox 7">
@@ -8335,7 +8431,7 @@
             </p:txBody>
           </p:sp>
         </mc:Choice>
-        <mc:Fallback>
+        <mc:Fallback xmlns="">
           <p:sp>
             <p:nvSpPr>
               <p:cNvPr id="8" name="TextBox 7">
@@ -8380,8 +8476,8 @@
           </p:sp>
         </mc:Fallback>
       </mc:AlternateContent>
-      <mc:AlternateContent xmlns:mc="http://schemas.openxmlformats.org/markup-compatibility/2006">
-        <mc:Choice xmlns:a14="http://schemas.microsoft.com/office/drawing/2010/main" Requires="a14">
+      <mc:AlternateContent xmlns:mc="http://schemas.openxmlformats.org/markup-compatibility/2006" xmlns:a14="http://schemas.microsoft.com/office/drawing/2010/main">
+        <mc:Choice Requires="a14">
           <p:sp>
             <p:nvSpPr>
               <p:cNvPr id="10" name="TextBox 9">
@@ -8410,6 +8506,7 @@
               </a:bodyPr>
               <a:lstStyle/>
               <a:p>
+                <a:pPr/>
                 <a14:m>
                   <m:oMathPara xmlns:m="http://schemas.openxmlformats.org/officeDocument/2006/math">
                     <m:oMathParaPr>
@@ -8551,7 +8648,7 @@
             </p:txBody>
           </p:sp>
         </mc:Choice>
-        <mc:Fallback>
+        <mc:Fallback xmlns="">
           <p:sp>
             <p:nvSpPr>
               <p:cNvPr id="10" name="TextBox 9">
@@ -8596,8 +8693,8 @@
           </p:sp>
         </mc:Fallback>
       </mc:AlternateContent>
-      <mc:AlternateContent xmlns:mc="http://schemas.openxmlformats.org/markup-compatibility/2006">
-        <mc:Choice xmlns:a14="http://schemas.microsoft.com/office/drawing/2010/main" Requires="a14">
+      <mc:AlternateContent xmlns:mc="http://schemas.openxmlformats.org/markup-compatibility/2006" xmlns:a14="http://schemas.microsoft.com/office/drawing/2010/main">
+        <mc:Choice Requires="a14">
           <p:sp>
             <p:nvSpPr>
               <p:cNvPr id="12" name="TextBox 11">
@@ -8917,7 +9014,7 @@
             </p:txBody>
           </p:sp>
         </mc:Choice>
-        <mc:Fallback>
+        <mc:Fallback xmlns="">
           <p:sp>
             <p:nvSpPr>
               <p:cNvPr id="12" name="TextBox 11">
@@ -8962,8 +9059,8 @@
           </p:sp>
         </mc:Fallback>
       </mc:AlternateContent>
-      <mc:AlternateContent xmlns:mc="http://schemas.openxmlformats.org/markup-compatibility/2006">
-        <mc:Choice xmlns:a14="http://schemas.microsoft.com/office/drawing/2010/main" Requires="a14">
+      <mc:AlternateContent xmlns:mc="http://schemas.openxmlformats.org/markup-compatibility/2006" xmlns:a14="http://schemas.microsoft.com/office/drawing/2010/main">
+        <mc:Choice Requires="a14">
           <p:sp>
             <p:nvSpPr>
               <p:cNvPr id="13" name="TextBox 12">
@@ -9283,7 +9380,7 @@
             </p:txBody>
           </p:sp>
         </mc:Choice>
-        <mc:Fallback>
+        <mc:Fallback xmlns="">
           <p:sp>
             <p:nvSpPr>
               <p:cNvPr id="13" name="TextBox 12">
@@ -9649,7 +9746,6 @@
               </a:bodyPr>
               <a:lstStyle/>
               <a:p>
-                <a:pPr/>
                 <a:r>
                   <a:rPr lang="en-US" sz="2400" b="0" dirty="0"/>
                   <a:t>Better metric: </a:t>
@@ -9659,7 +9755,7 @@
                     <m:sSub>
                       <m:sSubPr>
                         <m:ctrlPr>
-                          <a:rPr lang="en-US" sz="2400" b="0" i="1" smtClean="0">
+                          <a:rPr lang="en-US" sz="2400" b="0" i="0" dirty="0" smtClean="0">
                             <a:latin typeface="Cambria Math" panose="02040503050406030204" pitchFamily="18" charset="0"/>
                           </a:rPr>
                         </m:ctrlPr>
@@ -9668,139 +9764,173 @@
                         <m:sSub>
                           <m:sSubPr>
                             <m:ctrlPr>
-                              <a:rPr lang="en-US" sz="2400" b="0" i="1" smtClean="0">
+                              <a:rPr lang="en-US" sz="2400" b="0" i="0" dirty="0" smtClean="0">
                                 <a:latin typeface="Cambria Math" panose="02040503050406030204" pitchFamily="18" charset="0"/>
                               </a:rPr>
                             </m:ctrlPr>
                           </m:sSubPr>
                           <m:e>
                             <m:r>
-                              <a:rPr lang="en-US" sz="2400" b="0" i="1" smtClean="0">
+                              <m:rPr>
+                                <m:sty m:val="p"/>
+                              </m:rPr>
+                              <a:rPr lang="en-US" sz="2400" b="0" i="0" dirty="0" smtClean="0">
                                 <a:latin typeface="Cambria Math" panose="02040503050406030204" pitchFamily="18" charset="0"/>
                               </a:rPr>
-                              <m:t>𝐸</m:t>
+                              <m:t>E</m:t>
                             </m:r>
                           </m:e>
                           <m:sub>
                             <m:r>
-                              <a:rPr lang="en-US" sz="2400" b="0" i="1" smtClean="0">
+                              <m:rPr>
+                                <m:sty m:val="p"/>
+                              </m:rPr>
+                              <a:rPr lang="en-US" sz="2400" b="0" i="0" dirty="0" smtClean="0">
                                 <a:latin typeface="Cambria Math" panose="02040503050406030204" pitchFamily="18" charset="0"/>
                               </a:rPr>
-                              <m:t>𝐷</m:t>
+                              <m:t>D</m:t>
                             </m:r>
                           </m:sub>
                         </m:sSub>
                         <m:r>
-                          <a:rPr lang="en-US" sz="2400" b="0" i="1" smtClean="0">
-                            <a:latin typeface="Cambria Math" panose="02040503050406030204" pitchFamily="18" charset="0"/>
-                          </a:rPr>
-                          <m:t>[</m:t>
+                          <a:rPr lang="en-US" sz="2400" b="0" i="0" dirty="0" smtClean="0">
+                            <a:latin typeface="Cambria Math" panose="02040503050406030204" pitchFamily="18" charset="0"/>
+                          </a:rPr>
+                          <m:t>[(</m:t>
                         </m:r>
                         <m:r>
-                          <a:rPr lang="en-US" sz="2400" b="0" i="1" smtClean="0">
-                            <a:latin typeface="Cambria Math" panose="02040503050406030204" pitchFamily="18" charset="0"/>
-                          </a:rPr>
-                          <m:t>𝐸</m:t>
+                          <m:rPr>
+                            <m:sty m:val="p"/>
+                          </m:rPr>
+                          <a:rPr lang="en-US" sz="2400" b="0" i="0" dirty="0" smtClean="0">
+                            <a:latin typeface="Cambria Math" panose="02040503050406030204" pitchFamily="18" charset="0"/>
+                          </a:rPr>
+                          <m:t>E</m:t>
                         </m:r>
                       </m:e>
                       <m:sub>
                         <m:r>
-                          <a:rPr lang="en-US" sz="2400" b="0" i="1" smtClean="0">
+                          <a:rPr lang="en-US" sz="2400" b="0" i="1" dirty="0" smtClean="0">
                             <a:latin typeface="Cambria Math" panose="02040503050406030204" pitchFamily="18" charset="0"/>
                           </a:rPr>
                           <m:t>𝐷</m:t>
                         </m:r>
                       </m:sub>
                     </m:sSub>
-                    <m:d>
-                      <m:dPr>
-                        <m:begChr m:val="["/>
-                        <m:endChr m:val="]"/>
+                    <m:sSup>
+                      <m:sSupPr>
                         <m:ctrlPr>
-                          <a:rPr lang="en-US" sz="2400" b="0" i="1" smtClean="0">
+                          <a:rPr lang="en-US" sz="2400" i="1" dirty="0" smtClean="0">
                             <a:latin typeface="Cambria Math" panose="02040503050406030204" pitchFamily="18" charset="0"/>
                           </a:rPr>
                         </m:ctrlPr>
-                      </m:dPr>
+                      </m:sSupPr>
                       <m:e>
-                        <m:r>
-                          <a:rPr lang="en-US" sz="2400" b="0" i="1" smtClean="0">
-                            <a:latin typeface="Cambria Math" panose="02040503050406030204" pitchFamily="18" charset="0"/>
-                          </a:rPr>
-                          <m:t>𝑔</m:t>
-                        </m:r>
                         <m:d>
                           <m:dPr>
+                            <m:begChr m:val="["/>
+                            <m:endChr m:val="]"/>
                             <m:ctrlPr>
-                              <a:rPr lang="en-US" sz="2400" b="0" i="1" smtClean="0">
+                              <a:rPr lang="en-US" sz="2400" i="1">
                                 <a:latin typeface="Cambria Math" panose="02040503050406030204" pitchFamily="18" charset="0"/>
                               </a:rPr>
                             </m:ctrlPr>
                           </m:dPr>
                           <m:e>
                             <m:r>
-                              <a:rPr lang="en-US" sz="2400" b="0" i="1" smtClean="0">
+                              <a:rPr lang="en-US" sz="2400" i="1">
                                 <a:latin typeface="Cambria Math" panose="02040503050406030204" pitchFamily="18" charset="0"/>
                               </a:rPr>
-                              <m:t>𝑋</m:t>
+                              <m:t>𝑔</m:t>
                             </m:r>
-                            <m:r>
-                              <a:rPr lang="en-US" sz="2400" b="0" i="1" smtClean="0">
-                                <a:latin typeface="Cambria Math" panose="02040503050406030204" pitchFamily="18" charset="0"/>
-                              </a:rPr>
-                              <m:t>;</m:t>
-                            </m:r>
-                            <m:r>
-                              <a:rPr lang="en-US" sz="2400" b="0" i="1" smtClean="0">
-                                <a:latin typeface="Cambria Math" panose="02040503050406030204" pitchFamily="18" charset="0"/>
-                              </a:rPr>
-                              <m:t>𝐷</m:t>
-                            </m:r>
+                            <m:d>
+                              <m:dPr>
+                                <m:ctrlPr>
+                                  <a:rPr lang="en-US" sz="2400" i="1">
+                                    <a:latin typeface="Cambria Math" panose="02040503050406030204" pitchFamily="18" charset="0"/>
+                                  </a:rPr>
+                                </m:ctrlPr>
+                              </m:dPr>
+                              <m:e>
+                                <m:r>
+                                  <a:rPr lang="en-US" sz="2400" i="1">
+                                    <a:latin typeface="Cambria Math" panose="02040503050406030204" pitchFamily="18" charset="0"/>
+                                  </a:rPr>
+                                  <m:t>𝑋</m:t>
+                                </m:r>
+                                <m:r>
+                                  <a:rPr lang="en-US" sz="2400" i="1">
+                                    <a:latin typeface="Cambria Math" panose="02040503050406030204" pitchFamily="18" charset="0"/>
+                                  </a:rPr>
+                                  <m:t>;</m:t>
+                                </m:r>
+                                <m:r>
+                                  <a:rPr lang="en-US" sz="2400" i="1">
+                                    <a:latin typeface="Cambria Math" panose="02040503050406030204" pitchFamily="18" charset="0"/>
+                                  </a:rPr>
+                                  <m:t>𝐷</m:t>
+                                </m:r>
+                              </m:e>
+                            </m:d>
                           </m:e>
                         </m:d>
+                        <m:r>
+                          <a:rPr lang="en-US" sz="2400" i="1">
+                            <a:latin typeface="Cambria Math" panose="02040503050406030204" pitchFamily="18" charset="0"/>
+                          </a:rPr>
+                          <m:t> −</m:t>
+                        </m:r>
+                        <m:r>
+                          <a:rPr lang="en-US" sz="2400" i="1">
+                            <a:latin typeface="Cambria Math" panose="02040503050406030204" pitchFamily="18" charset="0"/>
+                          </a:rPr>
+                          <m:t>𝑔</m:t>
+                        </m:r>
+                        <m:r>
+                          <a:rPr lang="en-US" sz="2400" i="1">
+                            <a:latin typeface="Cambria Math" panose="02040503050406030204" pitchFamily="18" charset="0"/>
+                          </a:rPr>
+                          <m:t>(</m:t>
+                        </m:r>
+                        <m:r>
+                          <a:rPr lang="en-US" sz="2400" i="1">
+                            <a:latin typeface="Cambria Math" panose="02040503050406030204" pitchFamily="18" charset="0"/>
+                          </a:rPr>
+                          <m:t>𝑋</m:t>
+                        </m:r>
+                        <m:r>
+                          <a:rPr lang="en-US" sz="2400" i="1">
+                            <a:latin typeface="Cambria Math" panose="02040503050406030204" pitchFamily="18" charset="0"/>
+                          </a:rPr>
+                          <m:t>;</m:t>
+                        </m:r>
+                        <m:r>
+                          <a:rPr lang="en-US" sz="2400" i="1">
+                            <a:latin typeface="Cambria Math" panose="02040503050406030204" pitchFamily="18" charset="0"/>
+                          </a:rPr>
+                          <m:t>𝐷</m:t>
+                        </m:r>
+                        <m:r>
+                          <a:rPr lang="en-US" sz="2400" i="1">
+                            <a:latin typeface="Cambria Math" panose="02040503050406030204" pitchFamily="18" charset="0"/>
+                          </a:rPr>
+                          <m:t>))</m:t>
+                        </m:r>
                       </m:e>
-                    </m:d>
+                      <m:sup>
+                        <m:r>
+                          <a:rPr lang="en-US" sz="2400" b="0" i="1" dirty="0" smtClean="0">
+                            <a:latin typeface="Cambria Math" panose="02040503050406030204" pitchFamily="18" charset="0"/>
+                          </a:rPr>
+                          <m:t>2</m:t>
+                        </m:r>
+                      </m:sup>
+                    </m:sSup>
                     <m:r>
                       <a:rPr lang="en-US" sz="2400" b="0" i="1" smtClean="0">
                         <a:latin typeface="Cambria Math" panose="02040503050406030204" pitchFamily="18" charset="0"/>
                       </a:rPr>
-                      <m:t> −</m:t>
-                    </m:r>
-                    <m:r>
-                      <a:rPr lang="en-US" sz="2400" b="0" i="1" smtClean="0">
-                        <a:latin typeface="Cambria Math" panose="02040503050406030204" pitchFamily="18" charset="0"/>
-                      </a:rPr>
-                      <m:t>𝑔</m:t>
-                    </m:r>
-                    <m:r>
-                      <a:rPr lang="en-US" sz="2400" b="0" i="1" smtClean="0">
-                        <a:latin typeface="Cambria Math" panose="02040503050406030204" pitchFamily="18" charset="0"/>
-                      </a:rPr>
-                      <m:t>(</m:t>
-                    </m:r>
-                    <m:r>
-                      <a:rPr lang="en-US" sz="2400" b="0" i="1" smtClean="0">
-                        <a:latin typeface="Cambria Math" panose="02040503050406030204" pitchFamily="18" charset="0"/>
-                      </a:rPr>
-                      <m:t>𝑋</m:t>
-                    </m:r>
-                    <m:r>
-                      <a:rPr lang="en-US" sz="2400" b="0" i="1" smtClean="0">
-                        <a:latin typeface="Cambria Math" panose="02040503050406030204" pitchFamily="18" charset="0"/>
-                      </a:rPr>
-                      <m:t>;</m:t>
-                    </m:r>
-                    <m:r>
-                      <a:rPr lang="en-US" sz="2400" b="0" i="1" smtClean="0">
-                        <a:latin typeface="Cambria Math" panose="02040503050406030204" pitchFamily="18" charset="0"/>
-                      </a:rPr>
-                      <m:t>𝐷</m:t>
-                    </m:r>
-                    <m:r>
-                      <a:rPr lang="en-US" sz="2400" b="0" i="1" smtClean="0">
-                        <a:latin typeface="Cambria Math" panose="02040503050406030204" pitchFamily="18" charset="0"/>
-                      </a:rPr>
-                      <m:t>)]</m:t>
+                      <m:t>]</m:t>
                     </m:r>
                   </m:oMath>
                 </a14:m>
@@ -9889,8 +10019,8 @@
           </a:p>
         </p:txBody>
       </p:sp>
-      <mc:AlternateContent xmlns:mc="http://schemas.openxmlformats.org/markup-compatibility/2006">
-        <mc:Choice xmlns:a14="http://schemas.microsoft.com/office/drawing/2010/main" Requires="a14">
+      <mc:AlternateContent xmlns:mc="http://schemas.openxmlformats.org/markup-compatibility/2006" xmlns:a14="http://schemas.microsoft.com/office/drawing/2010/main">
+        <mc:Choice Requires="a14">
           <p:sp>
             <p:nvSpPr>
               <p:cNvPr id="16" name="TextBox 15">
@@ -10037,7 +10167,7 @@
             </p:txBody>
           </p:sp>
         </mc:Choice>
-        <mc:Fallback>
+        <mc:Fallback xmlns="">
           <p:sp>
             <p:nvSpPr>
               <p:cNvPr id="16" name="TextBox 15">
@@ -10408,8 +10538,8 @@
           </a:p>
         </p:txBody>
       </p:sp>
-      <mc:AlternateContent xmlns:mc="http://schemas.openxmlformats.org/markup-compatibility/2006">
-        <mc:Choice xmlns:a14="http://schemas.microsoft.com/office/drawing/2010/main" Requires="a14">
+      <mc:AlternateContent xmlns:mc="http://schemas.openxmlformats.org/markup-compatibility/2006" xmlns:a14="http://schemas.microsoft.com/office/drawing/2010/main">
+        <mc:Choice Requires="a14">
           <p:sp>
             <p:nvSpPr>
               <p:cNvPr id="11" name="TextBox 10">
@@ -10438,6 +10568,7 @@
               </a:bodyPr>
               <a:lstStyle/>
               <a:p>
+                <a:pPr/>
                 <a14:m>
                   <m:oMathPara xmlns:m="http://schemas.openxmlformats.org/officeDocument/2006/math">
                     <m:oMathParaPr>
@@ -10542,7 +10673,7 @@
             </p:txBody>
           </p:sp>
         </mc:Choice>
-        <mc:Fallback>
+        <mc:Fallback xmlns="">
           <p:sp>
             <p:nvSpPr>
               <p:cNvPr id="11" name="TextBox 10">
@@ -11347,7 +11478,7 @@
           <a:p>
             <a:r>
               <a:rPr lang="en-US" sz="2800" dirty="0"/>
-              <a:t>True Negative: FN </a:t>
+              <a:t>False Negative: FN </a:t>
             </a:r>
           </a:p>
         </p:txBody>
@@ -12322,8 +12453,8 @@
           </a:p>
         </p:txBody>
       </p:sp>
-      <mc:AlternateContent xmlns:mc="http://schemas.openxmlformats.org/markup-compatibility/2006">
-        <mc:Choice xmlns:a14="http://schemas.microsoft.com/office/drawing/2010/main" Requires="a14">
+      <mc:AlternateContent xmlns:mc="http://schemas.openxmlformats.org/markup-compatibility/2006" xmlns:a14="http://schemas.microsoft.com/office/drawing/2010/main">
+        <mc:Choice Requires="a14">
           <p:sp>
             <p:nvSpPr>
               <p:cNvPr id="7" name="TextBox 6">
@@ -12412,7 +12543,7 @@
             </p:txBody>
           </p:sp>
         </mc:Choice>
-        <mc:Fallback>
+        <mc:Fallback xmlns="">
           <p:sp>
             <p:nvSpPr>
               <p:cNvPr id="7" name="TextBox 6">
@@ -12715,8 +12846,8 @@
           </a:p>
         </p:txBody>
       </p:sp>
-      <mc:AlternateContent xmlns:mc="http://schemas.openxmlformats.org/markup-compatibility/2006">
-        <mc:Choice xmlns:a14="http://schemas.microsoft.com/office/drawing/2010/main" Requires="a14">
+      <mc:AlternateContent xmlns:mc="http://schemas.openxmlformats.org/markup-compatibility/2006" xmlns:a14="http://schemas.microsoft.com/office/drawing/2010/main">
+        <mc:Choice Requires="a14">
           <p:sp>
             <p:nvSpPr>
               <p:cNvPr id="9" name="TextBox 8">
@@ -12874,7 +13005,7 @@
             </p:txBody>
           </p:sp>
         </mc:Choice>
-        <mc:Fallback>
+        <mc:Fallback xmlns="">
           <p:sp>
             <p:nvSpPr>
               <p:cNvPr id="9" name="TextBox 8">
@@ -13450,8 +13581,8 @@
           </a:p>
         </p:txBody>
       </p:sp>
-      <mc:AlternateContent xmlns:mc="http://schemas.openxmlformats.org/markup-compatibility/2006">
-        <mc:Choice xmlns:a14="http://schemas.microsoft.com/office/drawing/2010/main" Requires="a14">
+      <mc:AlternateContent xmlns:mc="http://schemas.openxmlformats.org/markup-compatibility/2006" xmlns:a14="http://schemas.microsoft.com/office/drawing/2010/main">
+        <mc:Choice Requires="a14">
           <p:sp>
             <p:nvSpPr>
               <p:cNvPr id="9" name="TextBox 8">
@@ -13628,7 +13759,7 @@
             </p:txBody>
           </p:sp>
         </mc:Choice>
-        <mc:Fallback>
+        <mc:Fallback xmlns="">
           <p:sp>
             <p:nvSpPr>
               <p:cNvPr id="9" name="TextBox 8">
@@ -13673,8 +13804,8 @@
           </p:sp>
         </mc:Fallback>
       </mc:AlternateContent>
-      <mc:AlternateContent xmlns:mc="http://schemas.openxmlformats.org/markup-compatibility/2006">
-        <mc:Choice xmlns:a14="http://schemas.microsoft.com/office/drawing/2010/main" Requires="a14">
+      <mc:AlternateContent xmlns:mc="http://schemas.openxmlformats.org/markup-compatibility/2006" xmlns:a14="http://schemas.microsoft.com/office/drawing/2010/main">
+        <mc:Choice Requires="a14">
           <p:sp>
             <p:nvSpPr>
               <p:cNvPr id="7" name="TextBox 6">
@@ -13879,7 +14010,7 @@
             </p:txBody>
           </p:sp>
         </mc:Choice>
-        <mc:Fallback>
+        <mc:Fallback xmlns="">
           <p:sp>
             <p:nvSpPr>
               <p:cNvPr id="7" name="TextBox 6">
@@ -13924,8 +14055,8 @@
           </p:sp>
         </mc:Fallback>
       </mc:AlternateContent>
-      <mc:AlternateContent xmlns:mc="http://schemas.openxmlformats.org/markup-compatibility/2006">
-        <mc:Choice xmlns:a14="http://schemas.microsoft.com/office/drawing/2010/main" Requires="a14">
+      <mc:AlternateContent xmlns:mc="http://schemas.openxmlformats.org/markup-compatibility/2006" xmlns:a14="http://schemas.microsoft.com/office/drawing/2010/main">
+        <mc:Choice Requires="a14">
           <p:sp>
             <p:nvSpPr>
               <p:cNvPr id="8" name="TextBox 7">
@@ -14263,7 +14394,7 @@
             </p:txBody>
           </p:sp>
         </mc:Choice>
-        <mc:Fallback>
+        <mc:Fallback xmlns="">
           <p:sp>
             <p:nvSpPr>
               <p:cNvPr id="8" name="TextBox 7">
@@ -14308,8 +14439,8 @@
           </p:sp>
         </mc:Fallback>
       </mc:AlternateContent>
-      <mc:AlternateContent xmlns:mc="http://schemas.openxmlformats.org/markup-compatibility/2006">
-        <mc:Choice xmlns:a14="http://schemas.microsoft.com/office/drawing/2010/main" Requires="a14">
+      <mc:AlternateContent xmlns:mc="http://schemas.openxmlformats.org/markup-compatibility/2006" xmlns:a14="http://schemas.microsoft.com/office/drawing/2010/main">
+        <mc:Choice Requires="a14">
           <p:sp>
             <p:nvSpPr>
               <p:cNvPr id="11" name="TextBox 10">
@@ -14647,7 +14778,7 @@
             </p:txBody>
           </p:sp>
         </mc:Choice>
-        <mc:Fallback>
+        <mc:Fallback xmlns="">
           <p:sp>
             <p:nvSpPr>
               <p:cNvPr id="11" name="TextBox 10">

</xml_diff>